<commit_message>
Updated SQL presentation files for PshSummit 2016
</commit_message>
<xml_diff>
--- a/PowerShell and DevOps Global Summit 2016/Unconventional SQL Server Tools in PowerShell/Unconventional SQL Server Tools in PowerShell.pptx
+++ b/PowerShell and DevOps Global Summit 2016/Unconventional SQL Server Tools in PowerShell/Unconventional SQL Server Tools in PowerShell.pptx
@@ -10,10 +10,11 @@
     <p:sldId id="259" r:id="rId4"/>
     <p:sldId id="263" r:id="rId5"/>
     <p:sldId id="264" r:id="rId6"/>
-    <p:sldId id="265" r:id="rId7"/>
-    <p:sldId id="261" r:id="rId8"/>
-    <p:sldId id="262" r:id="rId9"/>
-    <p:sldId id="257" r:id="rId10"/>
+    <p:sldId id="266" r:id="rId7"/>
+    <p:sldId id="265" r:id="rId8"/>
+    <p:sldId id="257" r:id="rId9"/>
+    <p:sldId id="261" r:id="rId10"/>
+    <p:sldId id="262" r:id="rId11"/>
   </p:sldIdLst>
   <p:sldSz cx="12192000" cy="6858000"/>
   <p:notesSz cx="6858000" cy="9144000"/>
@@ -721,7 +722,7 @@
           </a:lstStyle>
           <a:p>
             <a:r>
-              <a:rPr lang="en-US" smtClean="0"/>
+              <a:rPr lang="en-US"/>
               <a:t>Click to edit Master title style</a:t>
             </a:r>
             <a:endParaRPr lang="en-US" dirty="0"/>
@@ -841,7 +842,7 @@
           </a:lstStyle>
           <a:p>
             <a:r>
-              <a:rPr lang="en-US" smtClean="0"/>
+              <a:rPr lang="en-US"/>
               <a:t>Click to edit Master subtitle style</a:t>
             </a:r>
             <a:endParaRPr lang="en-US" dirty="0"/>
@@ -865,7 +866,7 @@
           <a:p>
             <a:fld id="{6AD6EE87-EBD5-4F12-A48A-63ACA297AC8F}" type="datetimeFigureOut">
               <a:rPr lang="en-US" smtClean="0"/>
-              <a:t>3/30/2016</a:t>
+              <a:t>4/6/2016</a:t>
             </a:fld>
             <a:endParaRPr lang="en-US" dirty="0"/>
           </a:p>
@@ -1000,7 +1001,7 @@
           </a:lstStyle>
           <a:p>
             <a:r>
-              <a:rPr lang="en-US" smtClean="0"/>
+              <a:rPr lang="en-US"/>
               <a:t>Click to edit Master title style</a:t>
             </a:r>
             <a:endParaRPr lang="en-US" dirty="0"/>
@@ -1123,7 +1124,7 @@
           <a:p>
             <a:pPr lvl="0"/>
             <a:r>
-              <a:rPr lang="en-US" smtClean="0"/>
+              <a:rPr lang="en-US"/>
               <a:t>Edit Master text styles</a:t>
             </a:r>
           </a:p>
@@ -1147,7 +1148,7 @@
             <a:fld id="{90298CD5-6C1E-4009-B41F-6DF62E31D3BE}" type="datetimeFigureOut">
               <a:rPr lang="en-US" smtClean="0"/>
               <a:pPr/>
-              <a:t>3/30/2016</a:t>
+              <a:t>4/6/2016</a:t>
             </a:fld>
             <a:endParaRPr lang="en-US" dirty="0"/>
           </a:p>
@@ -1253,7 +1254,7 @@
           </a:lstStyle>
           <a:p>
             <a:r>
-              <a:rPr lang="en-US" smtClean="0"/>
+              <a:rPr lang="en-US"/>
               <a:t>Click to edit Master title style</a:t>
             </a:r>
             <a:endParaRPr lang="en-US" dirty="0"/>
@@ -1317,7 +1318,7 @@
           <a:p>
             <a:pPr lvl="0"/>
             <a:r>
-              <a:rPr lang="en-US" smtClean="0"/>
+              <a:rPr lang="en-US"/>
               <a:t>Edit Master text styles</a:t>
             </a:r>
           </a:p>
@@ -1439,7 +1440,7 @@
           <a:p>
             <a:pPr lvl="0"/>
             <a:r>
-              <a:rPr lang="en-US" smtClean="0"/>
+              <a:rPr lang="en-US"/>
               <a:t>Edit Master text styles</a:t>
             </a:r>
           </a:p>
@@ -1463,7 +1464,7 @@
             <a:fld id="{90298CD5-6C1E-4009-B41F-6DF62E31D3BE}" type="datetimeFigureOut">
               <a:rPr lang="en-US" smtClean="0"/>
               <a:pPr/>
-              <a:t>3/30/2016</a:t>
+              <a:t>4/6/2016</a:t>
             </a:fld>
             <a:endParaRPr lang="en-US" dirty="0"/>
           </a:p>
@@ -1651,7 +1652,7 @@
           </a:lstStyle>
           <a:p>
             <a:r>
-              <a:rPr lang="en-US" smtClean="0"/>
+              <a:rPr lang="en-US"/>
               <a:t>Click to edit Master title style</a:t>
             </a:r>
             <a:endParaRPr lang="en-US" dirty="0"/>
@@ -1774,7 +1775,7 @@
           <a:p>
             <a:pPr lvl="0"/>
             <a:r>
-              <a:rPr lang="en-US" smtClean="0"/>
+              <a:rPr lang="en-US"/>
               <a:t>Edit Master text styles</a:t>
             </a:r>
           </a:p>
@@ -1798,7 +1799,7 @@
             <a:fld id="{90298CD5-6C1E-4009-B41F-6DF62E31D3BE}" type="datetimeFigureOut">
               <a:rPr lang="en-US" smtClean="0"/>
               <a:pPr/>
-              <a:t>3/30/2016</a:t>
+              <a:t>4/6/2016</a:t>
             </a:fld>
             <a:endParaRPr lang="en-US" dirty="0"/>
           </a:p>
@@ -1904,7 +1905,7 @@
           </a:lstStyle>
           <a:p>
             <a:r>
-              <a:rPr lang="en-US" smtClean="0"/>
+              <a:rPr lang="en-US"/>
               <a:t>Click to edit Master title style</a:t>
             </a:r>
             <a:endParaRPr lang="en-US" dirty="0"/>
@@ -1968,7 +1969,7 @@
           <a:p>
             <a:pPr lvl="0"/>
             <a:r>
-              <a:rPr lang="en-US" smtClean="0"/>
+              <a:rPr lang="en-US"/>
               <a:t>Edit Master text styles</a:t>
             </a:r>
           </a:p>
@@ -2090,7 +2091,7 @@
           <a:p>
             <a:pPr lvl="0"/>
             <a:r>
-              <a:rPr lang="en-US" smtClean="0"/>
+              <a:rPr lang="en-US"/>
               <a:t>Edit Master text styles</a:t>
             </a:r>
           </a:p>
@@ -2114,7 +2115,7 @@
             <a:fld id="{90298CD5-6C1E-4009-B41F-6DF62E31D3BE}" type="datetimeFigureOut">
               <a:rPr lang="en-US" smtClean="0"/>
               <a:pPr/>
-              <a:t>3/30/2016</a:t>
+              <a:t>4/6/2016</a:t>
             </a:fld>
             <a:endParaRPr lang="en-US" dirty="0"/>
           </a:p>
@@ -2302,7 +2303,7 @@
           </a:lstStyle>
           <a:p>
             <a:r>
-              <a:rPr lang="en-US" smtClean="0"/>
+              <a:rPr lang="en-US"/>
               <a:t>Click to edit Master title style</a:t>
             </a:r>
             <a:endParaRPr lang="en-US" dirty="0"/>
@@ -2363,7 +2364,7 @@
           <a:p>
             <a:pPr lvl="0"/>
             <a:r>
-              <a:rPr lang="en-US" smtClean="0"/>
+              <a:rPr lang="en-US"/>
               <a:t>Edit Master text styles</a:t>
             </a:r>
           </a:p>
@@ -2485,7 +2486,7 @@
           <a:p>
             <a:pPr lvl="0"/>
             <a:r>
-              <a:rPr lang="en-US" smtClean="0"/>
+              <a:rPr lang="en-US"/>
               <a:t>Edit Master text styles</a:t>
             </a:r>
           </a:p>
@@ -2509,7 +2510,7 @@
             <a:fld id="{90298CD5-6C1E-4009-B41F-6DF62E31D3BE}" type="datetimeFigureOut">
               <a:rPr lang="en-US" smtClean="0"/>
               <a:pPr/>
-              <a:t>3/30/2016</a:t>
+              <a:t>4/6/2016</a:t>
             </a:fld>
             <a:endParaRPr lang="en-US" dirty="0"/>
           </a:p>
@@ -2604,7 +2605,7 @@
           <a:lstStyle/>
           <a:p>
             <a:r>
-              <a:rPr lang="en-US" smtClean="0"/>
+              <a:rPr lang="en-US"/>
               <a:t>Click to edit Master title style</a:t>
             </a:r>
             <a:endParaRPr lang="en-US" dirty="0"/>
@@ -2628,35 +2629,35 @@
           <a:p>
             <a:pPr lvl="0"/>
             <a:r>
-              <a:rPr lang="en-US" smtClean="0"/>
+              <a:rPr lang="en-US"/>
               <a:t>Edit Master text styles</a:t>
             </a:r>
           </a:p>
           <a:p>
             <a:pPr lvl="1"/>
             <a:r>
-              <a:rPr lang="en-US" smtClean="0"/>
+              <a:rPr lang="en-US"/>
               <a:t>Second level</a:t>
             </a:r>
           </a:p>
           <a:p>
             <a:pPr lvl="2"/>
             <a:r>
-              <a:rPr lang="en-US" smtClean="0"/>
+              <a:rPr lang="en-US"/>
               <a:t>Third level</a:t>
             </a:r>
           </a:p>
           <a:p>
             <a:pPr lvl="3"/>
             <a:r>
-              <a:rPr lang="en-US" smtClean="0"/>
+              <a:rPr lang="en-US"/>
               <a:t>Fourth level</a:t>
             </a:r>
           </a:p>
           <a:p>
             <a:pPr lvl="4"/>
             <a:r>
-              <a:rPr lang="en-US" smtClean="0"/>
+              <a:rPr lang="en-US"/>
               <a:t>Fifth level</a:t>
             </a:r>
             <a:endParaRPr lang="en-US" dirty="0"/>
@@ -2680,7 +2681,7 @@
           <a:p>
             <a:fld id="{4CD73815-2707-4475-8F1A-B873CB631BB4}" type="datetimeFigureOut">
               <a:rPr lang="en-US" smtClean="0"/>
-              <a:t>3/30/2016</a:t>
+              <a:t>4/6/2016</a:t>
             </a:fld>
             <a:endParaRPr lang="en-US" dirty="0"/>
           </a:p>
@@ -2779,7 +2780,7 @@
           <a:lstStyle/>
           <a:p>
             <a:r>
-              <a:rPr lang="en-US" smtClean="0"/>
+              <a:rPr lang="en-US"/>
               <a:t>Click to edit Master title style</a:t>
             </a:r>
             <a:endParaRPr lang="en-US" dirty="0"/>
@@ -2808,35 +2809,35 @@
           <a:p>
             <a:pPr lvl="0"/>
             <a:r>
-              <a:rPr lang="en-US" smtClean="0"/>
+              <a:rPr lang="en-US"/>
               <a:t>Edit Master text styles</a:t>
             </a:r>
           </a:p>
           <a:p>
             <a:pPr lvl="1"/>
             <a:r>
-              <a:rPr lang="en-US" smtClean="0"/>
+              <a:rPr lang="en-US"/>
               <a:t>Second level</a:t>
             </a:r>
           </a:p>
           <a:p>
             <a:pPr lvl="2"/>
             <a:r>
-              <a:rPr lang="en-US" smtClean="0"/>
+              <a:rPr lang="en-US"/>
               <a:t>Third level</a:t>
             </a:r>
           </a:p>
           <a:p>
             <a:pPr lvl="3"/>
             <a:r>
-              <a:rPr lang="en-US" smtClean="0"/>
+              <a:rPr lang="en-US"/>
               <a:t>Fourth level</a:t>
             </a:r>
           </a:p>
           <a:p>
             <a:pPr lvl="4"/>
             <a:r>
-              <a:rPr lang="en-US" smtClean="0"/>
+              <a:rPr lang="en-US"/>
               <a:t>Fifth level</a:t>
             </a:r>
             <a:endParaRPr lang="en-US" dirty="0"/>
@@ -2860,7 +2861,7 @@
           <a:p>
             <a:fld id="{2A4AFB99-0EAB-4182-AFF8-E214C82A68F6}" type="datetimeFigureOut">
               <a:rPr lang="en-US" smtClean="0"/>
-              <a:t>3/30/2016</a:t>
+              <a:t>4/6/2016</a:t>
             </a:fld>
             <a:endParaRPr lang="en-US" dirty="0"/>
           </a:p>
@@ -2954,7 +2955,7 @@
           <a:lstStyle/>
           <a:p>
             <a:r>
-              <a:rPr lang="en-US" smtClean="0"/>
+              <a:rPr lang="en-US"/>
               <a:t>Click to edit Master title style</a:t>
             </a:r>
             <a:endParaRPr lang="en-US" dirty="0"/>
@@ -2978,35 +2979,35 @@
           <a:p>
             <a:pPr lvl="0"/>
             <a:r>
-              <a:rPr lang="en-US" smtClean="0"/>
+              <a:rPr lang="en-US"/>
               <a:t>Edit Master text styles</a:t>
             </a:r>
           </a:p>
           <a:p>
             <a:pPr lvl="1"/>
             <a:r>
-              <a:rPr lang="en-US" smtClean="0"/>
+              <a:rPr lang="en-US"/>
               <a:t>Second level</a:t>
             </a:r>
           </a:p>
           <a:p>
             <a:pPr lvl="2"/>
             <a:r>
-              <a:rPr lang="en-US" smtClean="0"/>
+              <a:rPr lang="en-US"/>
               <a:t>Third level</a:t>
             </a:r>
           </a:p>
           <a:p>
             <a:pPr lvl="3"/>
             <a:r>
-              <a:rPr lang="en-US" smtClean="0"/>
+              <a:rPr lang="en-US"/>
               <a:t>Fourth level</a:t>
             </a:r>
           </a:p>
           <a:p>
             <a:pPr lvl="4"/>
             <a:r>
-              <a:rPr lang="en-US" smtClean="0"/>
+              <a:rPr lang="en-US"/>
               <a:t>Fifth level</a:t>
             </a:r>
             <a:endParaRPr lang="en-US" dirty="0"/>
@@ -3030,7 +3031,7 @@
           <a:p>
             <a:fld id="{A5D3794B-289A-4A80-97D7-111025398D45}" type="datetimeFigureOut">
               <a:rPr lang="en-US" smtClean="0"/>
-              <a:t>3/30/2016</a:t>
+              <a:t>4/6/2016</a:t>
             </a:fld>
             <a:endParaRPr lang="en-US" dirty="0"/>
           </a:p>
@@ -3133,7 +3134,7 @@
           </a:lstStyle>
           <a:p>
             <a:r>
-              <a:rPr lang="en-US" smtClean="0"/>
+              <a:rPr lang="en-US"/>
               <a:t>Click to edit Master title style</a:t>
             </a:r>
             <a:endParaRPr lang="en-US" dirty="0"/>
@@ -3254,7 +3255,7 @@
           <a:p>
             <a:pPr lvl="0"/>
             <a:r>
-              <a:rPr lang="en-US" smtClean="0"/>
+              <a:rPr lang="en-US"/>
               <a:t>Edit Master text styles</a:t>
             </a:r>
           </a:p>
@@ -3277,7 +3278,7 @@
           <a:p>
             <a:fld id="{5A61015F-7CC6-4D0A-9D87-873EA4C304CC}" type="datetimeFigureOut">
               <a:rPr lang="en-US" smtClean="0"/>
-              <a:t>3/30/2016</a:t>
+              <a:t>4/6/2016</a:t>
             </a:fld>
             <a:endParaRPr lang="en-US" dirty="0"/>
           </a:p>
@@ -3401,7 +3402,7 @@
           <a:lstStyle/>
           <a:p>
             <a:r>
-              <a:rPr lang="en-US" smtClean="0"/>
+              <a:rPr lang="en-US"/>
               <a:t>Click to edit Master title style</a:t>
             </a:r>
             <a:endParaRPr lang="en-US" dirty="0"/>
@@ -3430,35 +3431,35 @@
           <a:p>
             <a:pPr lvl="0"/>
             <a:r>
-              <a:rPr lang="en-US" smtClean="0"/>
+              <a:rPr lang="en-US"/>
               <a:t>Edit Master text styles</a:t>
             </a:r>
           </a:p>
           <a:p>
             <a:pPr lvl="1"/>
             <a:r>
-              <a:rPr lang="en-US" smtClean="0"/>
+              <a:rPr lang="en-US"/>
               <a:t>Second level</a:t>
             </a:r>
           </a:p>
           <a:p>
             <a:pPr lvl="2"/>
             <a:r>
-              <a:rPr lang="en-US" smtClean="0"/>
+              <a:rPr lang="en-US"/>
               <a:t>Third level</a:t>
             </a:r>
           </a:p>
           <a:p>
             <a:pPr lvl="3"/>
             <a:r>
-              <a:rPr lang="en-US" smtClean="0"/>
+              <a:rPr lang="en-US"/>
               <a:t>Fourth level</a:t>
             </a:r>
           </a:p>
           <a:p>
             <a:pPr lvl="4"/>
             <a:r>
-              <a:rPr lang="en-US" smtClean="0"/>
+              <a:rPr lang="en-US"/>
               <a:t>Fifth level</a:t>
             </a:r>
             <a:endParaRPr lang="en-US" dirty="0"/>
@@ -3487,35 +3488,35 @@
           <a:p>
             <a:pPr lvl="0"/>
             <a:r>
-              <a:rPr lang="en-US" smtClean="0"/>
+              <a:rPr lang="en-US"/>
               <a:t>Edit Master text styles</a:t>
             </a:r>
           </a:p>
           <a:p>
             <a:pPr lvl="1"/>
             <a:r>
-              <a:rPr lang="en-US" smtClean="0"/>
+              <a:rPr lang="en-US"/>
               <a:t>Second level</a:t>
             </a:r>
           </a:p>
           <a:p>
             <a:pPr lvl="2"/>
             <a:r>
-              <a:rPr lang="en-US" smtClean="0"/>
+              <a:rPr lang="en-US"/>
               <a:t>Third level</a:t>
             </a:r>
           </a:p>
           <a:p>
             <a:pPr lvl="3"/>
             <a:r>
-              <a:rPr lang="en-US" smtClean="0"/>
+              <a:rPr lang="en-US"/>
               <a:t>Fourth level</a:t>
             </a:r>
           </a:p>
           <a:p>
             <a:pPr lvl="4"/>
             <a:r>
-              <a:rPr lang="en-US" smtClean="0"/>
+              <a:rPr lang="en-US"/>
               <a:t>Fifth level</a:t>
             </a:r>
             <a:endParaRPr lang="en-US" dirty="0"/>
@@ -3539,7 +3540,7 @@
           <a:p>
             <a:fld id="{93C6A301-0538-44EC-B09D-202E1042A48B}" type="datetimeFigureOut">
               <a:rPr lang="en-US" smtClean="0"/>
-              <a:t>3/30/2016</a:t>
+              <a:t>4/6/2016</a:t>
             </a:fld>
             <a:endParaRPr lang="en-US" dirty="0"/>
           </a:p>
@@ -3637,7 +3638,7 @@
           </a:lstStyle>
           <a:p>
             <a:r>
-              <a:rPr lang="en-US" smtClean="0"/>
+              <a:rPr lang="en-US"/>
               <a:t>Click to edit Master title style</a:t>
             </a:r>
             <a:endParaRPr lang="en-US" dirty="0"/>
@@ -3705,7 +3706,7 @@
           <a:p>
             <a:pPr lvl="0"/>
             <a:r>
-              <a:rPr lang="en-US" smtClean="0"/>
+              <a:rPr lang="en-US"/>
               <a:t>Edit Master text styles</a:t>
             </a:r>
           </a:p>
@@ -3735,35 +3736,35 @@
           <a:p>
             <a:pPr lvl="0"/>
             <a:r>
-              <a:rPr lang="en-US" smtClean="0"/>
+              <a:rPr lang="en-US"/>
               <a:t>Edit Master text styles</a:t>
             </a:r>
           </a:p>
           <a:p>
             <a:pPr lvl="1"/>
             <a:r>
-              <a:rPr lang="en-US" smtClean="0"/>
+              <a:rPr lang="en-US"/>
               <a:t>Second level</a:t>
             </a:r>
           </a:p>
           <a:p>
             <a:pPr lvl="2"/>
             <a:r>
-              <a:rPr lang="en-US" smtClean="0"/>
+              <a:rPr lang="en-US"/>
               <a:t>Third level</a:t>
             </a:r>
           </a:p>
           <a:p>
             <a:pPr lvl="3"/>
             <a:r>
-              <a:rPr lang="en-US" smtClean="0"/>
+              <a:rPr lang="en-US"/>
               <a:t>Fourth level</a:t>
             </a:r>
           </a:p>
           <a:p>
             <a:pPr lvl="4"/>
             <a:r>
-              <a:rPr lang="en-US" smtClean="0"/>
+              <a:rPr lang="en-US"/>
               <a:t>Fifth level</a:t>
             </a:r>
             <a:endParaRPr lang="en-US" dirty="0"/>
@@ -3831,7 +3832,7 @@
           <a:p>
             <a:pPr lvl="0"/>
             <a:r>
-              <a:rPr lang="en-US" smtClean="0"/>
+              <a:rPr lang="en-US"/>
               <a:t>Edit Master text styles</a:t>
             </a:r>
           </a:p>
@@ -3861,35 +3862,35 @@
           <a:p>
             <a:pPr lvl="0"/>
             <a:r>
-              <a:rPr lang="en-US" smtClean="0"/>
+              <a:rPr lang="en-US"/>
               <a:t>Edit Master text styles</a:t>
             </a:r>
           </a:p>
           <a:p>
             <a:pPr lvl="1"/>
             <a:r>
-              <a:rPr lang="en-US" smtClean="0"/>
+              <a:rPr lang="en-US"/>
               <a:t>Second level</a:t>
             </a:r>
           </a:p>
           <a:p>
             <a:pPr lvl="2"/>
             <a:r>
-              <a:rPr lang="en-US" smtClean="0"/>
+              <a:rPr lang="en-US"/>
               <a:t>Third level</a:t>
             </a:r>
           </a:p>
           <a:p>
             <a:pPr lvl="3"/>
             <a:r>
-              <a:rPr lang="en-US" smtClean="0"/>
+              <a:rPr lang="en-US"/>
               <a:t>Fourth level</a:t>
             </a:r>
           </a:p>
           <a:p>
             <a:pPr lvl="4"/>
             <a:r>
-              <a:rPr lang="en-US" smtClean="0"/>
+              <a:rPr lang="en-US"/>
               <a:t>Fifth level</a:t>
             </a:r>
             <a:endParaRPr lang="en-US" dirty="0"/>
@@ -3913,7 +3914,7 @@
           <a:p>
             <a:fld id="{D789574A-8875-45EF-8EA2-3CAA0F7ABC4C}" type="datetimeFigureOut">
               <a:rPr lang="en-US" smtClean="0"/>
-              <a:t>3/30/2016</a:t>
+              <a:t>4/6/2016</a:t>
             </a:fld>
             <a:endParaRPr lang="en-US" dirty="0"/>
           </a:p>
@@ -4012,7 +4013,7 @@
           <a:lstStyle/>
           <a:p>
             <a:r>
-              <a:rPr lang="en-US" smtClean="0"/>
+              <a:rPr lang="en-US"/>
               <a:t>Click to edit Master title style</a:t>
             </a:r>
             <a:endParaRPr lang="en-US" dirty="0"/>
@@ -4036,7 +4037,7 @@
           <a:p>
             <a:fld id="{67EF4D4C-5367-4C26-9E2B-D8088D7FCA81}" type="datetimeFigureOut">
               <a:rPr lang="en-US" smtClean="0"/>
-              <a:t>3/30/2016</a:t>
+              <a:t>4/6/2016</a:t>
             </a:fld>
             <a:endParaRPr lang="en-US" dirty="0"/>
           </a:p>
@@ -4131,7 +4132,7 @@
           <a:p>
             <a:fld id="{56E91E96-98B0-4413-9547-46F3504108EF}" type="datetimeFigureOut">
               <a:rPr lang="en-US" smtClean="0"/>
-              <a:t>3/30/2016</a:t>
+              <a:t>4/6/2016</a:t>
             </a:fld>
             <a:endParaRPr lang="en-US" dirty="0"/>
           </a:p>
@@ -4236,7 +4237,7 @@
           </a:lstStyle>
           <a:p>
             <a:r>
-              <a:rPr lang="en-US" smtClean="0"/>
+              <a:rPr lang="en-US"/>
               <a:t>Click to edit Master title style</a:t>
             </a:r>
             <a:endParaRPr lang="en-US" dirty="0"/>
@@ -4267,35 +4268,35 @@
           <a:p>
             <a:pPr lvl="0"/>
             <a:r>
-              <a:rPr lang="en-US" smtClean="0"/>
+              <a:rPr lang="en-US"/>
               <a:t>Edit Master text styles</a:t>
             </a:r>
           </a:p>
           <a:p>
             <a:pPr lvl="1"/>
             <a:r>
-              <a:rPr lang="en-US" smtClean="0"/>
+              <a:rPr lang="en-US"/>
               <a:t>Second level</a:t>
             </a:r>
           </a:p>
           <a:p>
             <a:pPr lvl="2"/>
             <a:r>
-              <a:rPr lang="en-US" smtClean="0"/>
+              <a:rPr lang="en-US"/>
               <a:t>Third level</a:t>
             </a:r>
           </a:p>
           <a:p>
             <a:pPr lvl="3"/>
             <a:r>
-              <a:rPr lang="en-US" smtClean="0"/>
+              <a:rPr lang="en-US"/>
               <a:t>Fourth level</a:t>
             </a:r>
           </a:p>
           <a:p>
             <a:pPr lvl="4"/>
             <a:r>
-              <a:rPr lang="en-US" smtClean="0"/>
+              <a:rPr lang="en-US"/>
               <a:t>Fifth level</a:t>
             </a:r>
             <a:endParaRPr lang="en-US" dirty="0"/>
@@ -4363,7 +4364,7 @@
           <a:p>
             <a:pPr lvl="0"/>
             <a:r>
-              <a:rPr lang="en-US" smtClean="0"/>
+              <a:rPr lang="en-US"/>
               <a:t>Edit Master text styles</a:t>
             </a:r>
           </a:p>
@@ -4386,7 +4387,7 @@
           <a:p>
             <a:fld id="{05C68B11-C5A8-448C-8CE9-B1A273C79CFC}" type="datetimeFigureOut">
               <a:rPr lang="en-US" smtClean="0"/>
-              <a:t>3/30/2016</a:t>
+              <a:t>4/6/2016</a:t>
             </a:fld>
             <a:endParaRPr lang="en-US" dirty="0"/>
           </a:p>
@@ -4491,7 +4492,7 @@
           </a:lstStyle>
           <a:p>
             <a:r>
-              <a:rPr lang="en-US" smtClean="0"/>
+              <a:rPr lang="en-US"/>
               <a:t>Click to edit Master title style</a:t>
             </a:r>
             <a:endParaRPr lang="en-US" dirty="0"/>
@@ -4558,7 +4559,7 @@
           </a:lstStyle>
           <a:p>
             <a:r>
-              <a:rPr lang="en-US" smtClean="0"/>
+              <a:rPr lang="en-US"/>
               <a:t>Click icon to add picture</a:t>
             </a:r>
             <a:endParaRPr lang="en-US" dirty="0"/>
@@ -4626,7 +4627,7 @@
           <a:p>
             <a:pPr lvl="0"/>
             <a:r>
-              <a:rPr lang="en-US" smtClean="0"/>
+              <a:rPr lang="en-US"/>
               <a:t>Edit Master text styles</a:t>
             </a:r>
           </a:p>
@@ -4691,7 +4692,7 @@
           <a:p>
             <a:fld id="{C7616CA0-919D-4A49-9C8A-62FDFB3A5183}" type="datetimeFigureOut">
               <a:rPr lang="en-US" smtClean="0"/>
-              <a:t>3/30/2016</a:t>
+              <a:t>4/6/2016</a:t>
             </a:fld>
             <a:endParaRPr lang="en-US" dirty="0"/>
           </a:p>
@@ -5289,7 +5290,7 @@
           <a:lstStyle/>
           <a:p>
             <a:r>
-              <a:rPr lang="en-US" smtClean="0"/>
+              <a:rPr lang="en-US"/>
               <a:t>Click to edit Master title style</a:t>
             </a:r>
             <a:endParaRPr lang="en-US" dirty="0"/>
@@ -5323,35 +5324,35 @@
           <a:p>
             <a:pPr lvl="0"/>
             <a:r>
-              <a:rPr lang="en-US" smtClean="0"/>
+              <a:rPr lang="en-US"/>
               <a:t>Edit Master text styles</a:t>
             </a:r>
           </a:p>
           <a:p>
             <a:pPr lvl="1"/>
             <a:r>
-              <a:rPr lang="en-US" smtClean="0"/>
+              <a:rPr lang="en-US"/>
               <a:t>Second level</a:t>
             </a:r>
           </a:p>
           <a:p>
             <a:pPr lvl="2"/>
             <a:r>
-              <a:rPr lang="en-US" smtClean="0"/>
+              <a:rPr lang="en-US"/>
               <a:t>Third level</a:t>
             </a:r>
           </a:p>
           <a:p>
             <a:pPr lvl="3"/>
             <a:r>
-              <a:rPr lang="en-US" smtClean="0"/>
+              <a:rPr lang="en-US"/>
               <a:t>Fourth level</a:t>
             </a:r>
           </a:p>
           <a:p>
             <a:pPr lvl="4"/>
             <a:r>
-              <a:rPr lang="en-US" smtClean="0"/>
+              <a:rPr lang="en-US"/>
               <a:t>Fifth level</a:t>
             </a:r>
             <a:endParaRPr lang="en-US" dirty="0"/>
@@ -5394,7 +5395,7 @@
             <a:fld id="{90298CD5-6C1E-4009-B41F-6DF62E31D3BE}" type="datetimeFigureOut">
               <a:rPr lang="en-US" smtClean="0"/>
               <a:pPr/>
-              <a:t>3/30/2016</a:t>
+              <a:t>4/6/2016</a:t>
             </a:fld>
             <a:endParaRPr lang="en-US" dirty="0"/>
           </a:p>
@@ -5935,18 +5936,9 @@
           <a:lstStyle/>
           <a:p>
             <a:r>
-              <a:rPr lang="en-US" dirty="0" smtClean="0"/>
-              <a:t>Building Unconventional </a:t>
-            </a:r>
-            <a:r>
               <a:rPr lang="en-US" dirty="0"/>
-              <a:t>SQL Server </a:t>
-            </a:r>
-            <a:r>
-              <a:rPr lang="en-US" dirty="0" smtClean="0"/>
-              <a:t>Tools</a:t>
-            </a:r>
-            <a:endParaRPr lang="en-US" dirty="0"/>
+              <a:t>Building Unconventional SQL Server Tools</a:t>
+            </a:r>
           </a:p>
         </p:txBody>
       </p:sp>
@@ -5966,12 +5958,44 @@
           <a:lstStyle/>
           <a:p>
             <a:r>
-              <a:rPr lang="en-US" dirty="0" smtClean="0"/>
-              <a:t>aka</a:t>
-            </a:r>
-            <a:r>
               <a:rPr lang="en-US" dirty="0"/>
-              <a:t>: Building Unconventional SQL Server Tools in PowerShell with Advanced Functions and Script Modules</a:t>
+              <a:t>aka: Building Unconventional SQL Server Tools in PowerShell with Advanced Functions and Script Modules</a:t>
+            </a:r>
+          </a:p>
+        </p:txBody>
+      </p:sp>
+      <p:sp>
+        <p:nvSpPr>
+          <p:cNvPr id="4" name="Rectangle 3"/>
+          <p:cNvSpPr/>
+          <p:nvPr/>
+        </p:nvSpPr>
+        <p:spPr>
+          <a:xfrm>
+            <a:off x="710109" y="6348261"/>
+            <a:ext cx="5654497" cy="369332"/>
+          </a:xfrm>
+          <a:prstGeom prst="rect">
+            <a:avLst/>
+          </a:prstGeom>
+        </p:spPr>
+        <p:txBody>
+          <a:bodyPr wrap="none">
+            <a:spAutoFit/>
+          </a:bodyPr>
+          <a:lstStyle/>
+          <a:p>
+            <a:r>
+              <a:rPr lang="en-US" dirty="0"/>
+              <a:t>Demo Code: </a:t>
+            </a:r>
+            <a:r>
+              <a:rPr lang="en-US" dirty="0">
+                <a:solidFill>
+                  <a:srgbClr val="FF0000"/>
+                </a:solidFill>
+              </a:rPr>
+              <a:t>github.com/mikefrobbins/Presentations</a:t>
             </a:r>
           </a:p>
         </p:txBody>
@@ -5986,13 +6010,239 @@
   <p:clrMapOvr>
     <a:masterClrMapping/>
   </p:clrMapOvr>
-  <p:timing>
-    <p:tnLst>
-      <p:par>
-        <p:cTn id="1" dur="indefinite" restart="never" nodeType="tmRoot"/>
-      </p:par>
-    </p:tnLst>
-  </p:timing>
+</p:sld>
+</file>
+
+<file path=ppt/slides/slide10.xml><?xml version="1.0" encoding="utf-8"?>
+<p:sld xmlns:a="http://schemas.openxmlformats.org/drawingml/2006/main" xmlns:r="http://schemas.openxmlformats.org/officeDocument/2006/relationships" xmlns:p="http://schemas.openxmlformats.org/presentationml/2006/main">
+  <p:cSld>
+    <p:spTree>
+      <p:nvGrpSpPr>
+        <p:cNvPr id="1" name=""/>
+        <p:cNvGrpSpPr/>
+        <p:nvPr/>
+      </p:nvGrpSpPr>
+      <p:grpSpPr>
+        <a:xfrm>
+          <a:off x="0" y="0"/>
+          <a:ext cx="0" cy="0"/>
+          <a:chOff x="0" y="0"/>
+          <a:chExt cx="0" cy="0"/>
+        </a:xfrm>
+      </p:grpSpPr>
+      <p:sp>
+        <p:nvSpPr>
+          <p:cNvPr id="2" name="Title 1"/>
+          <p:cNvSpPr>
+            <a:spLocks noGrp="1"/>
+          </p:cNvSpPr>
+          <p:nvPr>
+            <p:ph type="title"/>
+          </p:nvPr>
+        </p:nvSpPr>
+        <p:spPr/>
+        <p:txBody>
+          <a:bodyPr/>
+          <a:lstStyle/>
+          <a:p>
+            <a:r>
+              <a:rPr lang="en-US" dirty="0"/>
+              <a:t>Get-Contact –Identity ‘Presenter’</a:t>
+            </a:r>
+          </a:p>
+        </p:txBody>
+      </p:sp>
+      <p:sp>
+        <p:nvSpPr>
+          <p:cNvPr id="3" name="Content Placeholder 2"/>
+          <p:cNvSpPr>
+            <a:spLocks noGrp="1"/>
+          </p:cNvSpPr>
+          <p:nvPr>
+            <p:ph idx="1"/>
+          </p:nvPr>
+        </p:nvSpPr>
+        <p:spPr/>
+        <p:txBody>
+          <a:bodyPr/>
+          <a:lstStyle/>
+          <a:p>
+            <a:r>
+              <a:rPr lang="en-US" dirty="0"/>
+              <a:t>Blog: </a:t>
+            </a:r>
+            <a:r>
+              <a:rPr lang="en-US" dirty="0">
+                <a:hlinkClick r:id="rId2"/>
+              </a:rPr>
+              <a:t>mikefrobbins.com</a:t>
+            </a:r>
+            <a:r>
+              <a:rPr lang="en-US" dirty="0"/>
+              <a:t> (or MrPowerShell.com)</a:t>
+            </a:r>
+          </a:p>
+          <a:p>
+            <a:endParaRPr lang="en-US" dirty="0"/>
+          </a:p>
+          <a:p>
+            <a:endParaRPr lang="en-US" dirty="0"/>
+          </a:p>
+          <a:p>
+            <a:endParaRPr lang="en-US" dirty="0"/>
+          </a:p>
+          <a:p>
+            <a:endParaRPr lang="en-US" dirty="0"/>
+          </a:p>
+          <a:p>
+            <a:r>
+              <a:rPr lang="en-US" dirty="0"/>
+              <a:t>Twitter: </a:t>
+            </a:r>
+            <a:r>
+              <a:rPr lang="en-US" dirty="0">
+                <a:hlinkClick r:id="rId3"/>
+              </a:rPr>
+              <a:t>@mikefrobbins</a:t>
+            </a:r>
+            <a:endParaRPr lang="en-US" dirty="0"/>
+          </a:p>
+          <a:p>
+            <a:r>
+              <a:rPr lang="en-US" dirty="0"/>
+              <a:t>LinkedIn: </a:t>
+            </a:r>
+            <a:r>
+              <a:rPr lang="en-US" dirty="0">
+                <a:hlinkClick r:id="rId4"/>
+              </a:rPr>
+              <a:t>www.linkedin.com/in/mikefrobbins</a:t>
+            </a:r>
+            <a:endParaRPr lang="en-US" dirty="0"/>
+          </a:p>
+          <a:p>
+            <a:r>
+              <a:rPr lang="en-US" dirty="0"/>
+              <a:t>Email: See </a:t>
+            </a:r>
+            <a:r>
+              <a:rPr lang="en-US" dirty="0">
+                <a:hlinkClick r:id="rId5"/>
+              </a:rPr>
+              <a:t>mikefrobbins.com/about/</a:t>
+            </a:r>
+            <a:endParaRPr lang="en-US" dirty="0"/>
+          </a:p>
+          <a:p>
+            <a:r>
+              <a:rPr lang="en-US" dirty="0"/>
+              <a:t>User Group: </a:t>
+            </a:r>
+            <a:r>
+              <a:rPr lang="en-US" dirty="0">
+                <a:hlinkClick r:id="rId6"/>
+              </a:rPr>
+              <a:t>mspsug.com</a:t>
+            </a:r>
+            <a:r>
+              <a:rPr lang="en-US" dirty="0"/>
+              <a:t> (or MsPowerShell.com)</a:t>
+            </a:r>
+          </a:p>
+        </p:txBody>
+      </p:sp>
+      <p:pic>
+        <p:nvPicPr>
+          <p:cNvPr id="5" name="Picture 4">
+            <a:hlinkClick r:id="rId7"/>
+          </p:cNvPr>
+          <p:cNvPicPr>
+            <a:picLocks noChangeAspect="1"/>
+          </p:cNvPicPr>
+          <p:nvPr/>
+        </p:nvPicPr>
+        <p:blipFill>
+          <a:blip r:embed="rId8"/>
+          <a:stretch>
+            <a:fillRect/>
+          </a:stretch>
+        </p:blipFill>
+        <p:spPr>
+          <a:xfrm>
+            <a:off x="6810375" y="1930400"/>
+            <a:ext cx="1428750" cy="2038349"/>
+          </a:xfrm>
+          <a:prstGeom prst="rect">
+            <a:avLst/>
+          </a:prstGeom>
+        </p:spPr>
+      </p:pic>
+      <p:pic>
+        <p:nvPicPr>
+          <p:cNvPr id="6" name="Picture 5">
+            <a:hlinkClick r:id="rId9"/>
+          </p:cNvPr>
+          <p:cNvPicPr>
+            <a:picLocks noChangeAspect="1"/>
+          </p:cNvPicPr>
+          <p:nvPr/>
+        </p:nvPicPr>
+        <p:blipFill>
+          <a:blip r:embed="rId10"/>
+          <a:stretch>
+            <a:fillRect/>
+          </a:stretch>
+        </p:blipFill>
+        <p:spPr>
+          <a:xfrm>
+            <a:off x="6810375" y="4260187"/>
+            <a:ext cx="1428750" cy="1781175"/>
+          </a:xfrm>
+          <a:prstGeom prst="rect">
+            <a:avLst/>
+          </a:prstGeom>
+        </p:spPr>
+      </p:pic>
+      <p:pic>
+        <p:nvPicPr>
+          <p:cNvPr id="7" name="Picture 6"/>
+          <p:cNvPicPr>
+            <a:picLocks noChangeAspect="1"/>
+          </p:cNvPicPr>
+          <p:nvPr/>
+        </p:nvPicPr>
+        <p:blipFill>
+          <a:blip r:embed="rId11" cstate="print">
+            <a:extLst>
+              <a:ext uri="{28A0092B-C50C-407E-A947-70E740481C1C}">
+                <a14:useLocalDpi xmlns:a14="http://schemas.microsoft.com/office/drawing/2010/main" val="0"/>
+              </a:ext>
+            </a:extLst>
+          </a:blip>
+          <a:stretch>
+            <a:fillRect/>
+          </a:stretch>
+        </p:blipFill>
+        <p:spPr>
+          <a:xfrm>
+            <a:off x="1821016" y="2527089"/>
+            <a:ext cx="1578888" cy="1578888"/>
+          </a:xfrm>
+          <a:prstGeom prst="rect">
+            <a:avLst/>
+          </a:prstGeom>
+        </p:spPr>
+      </p:pic>
+    </p:spTree>
+    <p:extLst>
+      <p:ext uri="{BB962C8B-B14F-4D97-AF65-F5344CB8AC3E}">
+        <p14:creationId xmlns:p14="http://schemas.microsoft.com/office/powerpoint/2010/main" val="4048166820"/>
+      </p:ext>
+    </p:extLst>
+  </p:cSld>
+  <p:clrMapOvr>
+    <a:masterClrMapping/>
+  </p:clrMapOvr>
 </p:sld>
 </file>
 
@@ -6029,18 +6279,17 @@
           <a:lstStyle/>
           <a:p>
             <a:r>
-              <a:rPr lang="en-US" dirty="0" smtClean="0"/>
+              <a:rPr lang="en-US" dirty="0"/>
               <a:t>Get-Help –Name ‘</a:t>
             </a:r>
             <a:r>
-              <a:rPr lang="en-US" dirty="0" err="1" smtClean="0"/>
+              <a:rPr lang="en-US" dirty="0" err="1"/>
               <a:t>about_Presenter</a:t>
             </a:r>
             <a:r>
-              <a:rPr lang="en-US" dirty="0" smtClean="0"/>
+              <a:rPr lang="en-US" dirty="0"/>
               <a:t>’</a:t>
             </a:r>
-            <a:endParaRPr lang="en-US" dirty="0"/>
           </a:p>
         </p:txBody>
       </p:sp>
@@ -6060,76 +6309,59 @@
           <a:lstStyle/>
           <a:p>
             <a:r>
-              <a:rPr lang="en-US" dirty="0" smtClean="0"/>
+              <a:rPr lang="en-US" dirty="0"/>
               <a:t>Mike F Robbins</a:t>
             </a:r>
           </a:p>
           <a:p>
             <a:r>
-              <a:rPr lang="en-US" dirty="0" smtClean="0"/>
-              <a:t>Microsoft MVP on Windows </a:t>
-            </a:r>
-            <a:r>
               <a:rPr lang="en-US" dirty="0"/>
-              <a:t>PowerShell (Multiyear Recipient</a:t>
-            </a:r>
-            <a:r>
-              <a:rPr lang="en-US" dirty="0" smtClean="0"/>
-              <a:t>)</a:t>
-            </a:r>
-          </a:p>
-          <a:p>
-            <a:r>
-              <a:rPr lang="en-US" dirty="0" smtClean="0"/>
-              <a:t>SAPIEN Technologies </a:t>
-            </a:r>
+              <a:t>Microsoft MVP on Windows PowerShell</a:t>
+            </a:r>
+          </a:p>
+          <a:p>
             <a:r>
               <a:rPr lang="en-US" dirty="0"/>
-              <a:t>MVP (Multiyear Recipient</a:t>
-            </a:r>
-            <a:r>
-              <a:rPr lang="en-US" dirty="0" smtClean="0"/>
-              <a:t>)</a:t>
-            </a:r>
-          </a:p>
-          <a:p>
-            <a:r>
-              <a:rPr lang="en-US" dirty="0" smtClean="0"/>
+              <a:t>SAPIEN Technologies MVP</a:t>
+            </a:r>
+          </a:p>
+          <a:p>
+            <a:r>
+              <a:rPr lang="en-US" dirty="0"/>
               <a:t>Leader &amp; Co-Founder of the Mississippi PowerShell User Group</a:t>
             </a:r>
           </a:p>
           <a:p>
             <a:r>
-              <a:rPr lang="en-US" dirty="0" smtClean="0"/>
+              <a:rPr lang="en-US" dirty="0"/>
               <a:t>Co-Author of Windows PowerShell TFM 4</a:t>
             </a:r>
             <a:r>
-              <a:rPr lang="en-US" baseline="30000" dirty="0" smtClean="0"/>
+              <a:rPr lang="en-US" baseline="30000" dirty="0"/>
               <a:t>th</a:t>
             </a:r>
             <a:r>
-              <a:rPr lang="en-US" dirty="0" smtClean="0"/>
+              <a:rPr lang="en-US" dirty="0"/>
               <a:t> Edition</a:t>
             </a:r>
           </a:p>
           <a:p>
             <a:r>
-              <a:rPr lang="en-US" dirty="0" smtClean="0"/>
+              <a:rPr lang="en-US" dirty="0"/>
               <a:t>Author of Chapter 6 in the PowerShell Deep Dives book</a:t>
             </a:r>
           </a:p>
           <a:p>
             <a:r>
-              <a:rPr lang="en-US" dirty="0" smtClean="0"/>
+              <a:rPr lang="en-US" dirty="0"/>
               <a:t>Winner of the Advanced Category in the 2013 Scripting Games</a:t>
             </a:r>
           </a:p>
           <a:p>
             <a:r>
-              <a:rPr lang="en-US" dirty="0" smtClean="0"/>
+              <a:rPr lang="en-US" dirty="0"/>
               <a:t>Learn more about me @ mikefrobbins.com</a:t>
             </a:r>
-            <a:endParaRPr lang="en-US" dirty="0"/>
           </a:p>
         </p:txBody>
       </p:sp>
@@ -6197,13 +6429,6 @@
   <p:clrMapOvr>
     <a:masterClrMapping/>
   </p:clrMapOvr>
-  <p:timing>
-    <p:tnLst>
-      <p:par>
-        <p:cTn id="1" dur="indefinite" restart="never" nodeType="tmRoot"/>
-      </p:par>
-    </p:tnLst>
-  </p:timing>
 </p:sld>
 </file>
 
@@ -6240,10 +6465,9 @@
           <a:lstStyle/>
           <a:p>
             <a:r>
-              <a:rPr lang="en-US" dirty="0" smtClean="0"/>
+              <a:rPr lang="en-US" dirty="0"/>
               <a:t>Write-Output ‘Questions for Audience’</a:t>
             </a:r>
-            <a:endParaRPr lang="en-US" dirty="0"/>
           </a:p>
         </p:txBody>
       </p:sp>
@@ -6265,58 +6489,57 @@
           <a:lstStyle/>
           <a:p>
             <a:r>
-              <a:rPr lang="en-US" dirty="0" smtClean="0"/>
+              <a:rPr lang="en-US" dirty="0"/>
               <a:t>IT Pro’s</a:t>
             </a:r>
           </a:p>
           <a:p>
             <a:r>
-              <a:rPr lang="en-US" dirty="0" smtClean="0"/>
+              <a:rPr lang="en-US" dirty="0"/>
               <a:t>Developers</a:t>
             </a:r>
           </a:p>
           <a:p>
             <a:r>
-              <a:rPr lang="en-US" dirty="0" smtClean="0"/>
+              <a:rPr lang="en-US" dirty="0"/>
               <a:t>DBA’s</a:t>
             </a:r>
           </a:p>
           <a:p>
             <a:r>
-              <a:rPr lang="en-US" dirty="0" smtClean="0"/>
-              <a:t>PowerShell</a:t>
-            </a:r>
-          </a:p>
-          <a:p>
-            <a:r>
-              <a:rPr lang="en-US" dirty="0" smtClean="0"/>
+              <a:rPr lang="en-US" dirty="0"/>
               <a:t>Microsoft SQL Server</a:t>
             </a:r>
           </a:p>
           <a:p>
             <a:r>
-              <a:rPr lang="en-US" dirty="0" smtClean="0"/>
-              <a:t>Functions</a:t>
-            </a:r>
-          </a:p>
-          <a:p>
-            <a:r>
-              <a:rPr lang="en-US" dirty="0" smtClean="0"/>
-              <a:t>Modules</a:t>
-            </a:r>
-          </a:p>
-          <a:p>
-            <a:r>
-              <a:rPr lang="en-US" dirty="0" smtClean="0"/>
+              <a:rPr lang="en-US" dirty="0"/>
+              <a:t>Transact-SQL (T-SQL)</a:t>
+            </a:r>
+          </a:p>
+          <a:p>
+            <a:r>
+              <a:rPr lang="en-US" dirty="0"/>
+              <a:t>.NET Framework</a:t>
+            </a:r>
+          </a:p>
+          <a:p>
+            <a:r>
+              <a:rPr lang="en-US" dirty="0"/>
               <a:t>Source Control</a:t>
             </a:r>
           </a:p>
           <a:p>
             <a:r>
-              <a:rPr lang="en-US" dirty="0" smtClean="0"/>
+              <a:rPr lang="en-US" dirty="0"/>
               <a:t>Unit Testing via Pester</a:t>
             </a:r>
-            <a:endParaRPr lang="en-US" dirty="0"/>
+          </a:p>
+          <a:p>
+            <a:r>
+              <a:rPr lang="en-US" dirty="0"/>
+              <a:t>PS Script Analyzer</a:t>
+            </a:r>
           </a:p>
         </p:txBody>
       </p:sp>
@@ -6840,10 +7063,9 @@
           <a:lstStyle/>
           <a:p>
             <a:r>
-              <a:rPr lang="en-US" dirty="0" smtClean="0"/>
+              <a:rPr lang="en-US" dirty="0"/>
               <a:t>Set-Content ‘Information to Cover’</a:t>
             </a:r>
-            <a:endParaRPr lang="en-US" dirty="0"/>
           </a:p>
         </p:txBody>
       </p:sp>
@@ -6865,65 +7087,63 @@
           <a:lstStyle/>
           <a:p>
             <a:r>
-              <a:rPr lang="en-US" dirty="0" smtClean="0"/>
-              <a:t>SQLPS PowerShell Module</a:t>
-            </a:r>
-          </a:p>
-          <a:p>
-            <a:r>
-              <a:rPr lang="en-US" dirty="0" smtClean="0"/>
+              <a:rPr lang="en-US" dirty="0"/>
+              <a:t>SQL PowerShell Module and Snap-in</a:t>
+            </a:r>
+          </a:p>
+          <a:p>
+            <a:r>
+              <a:rPr lang="en-US" dirty="0"/>
               <a:t>SQL PowerShell Provider</a:t>
             </a:r>
-            <a:endParaRPr lang="en-US" dirty="0" smtClean="0"/>
-          </a:p>
-          <a:p>
-            <a:r>
-              <a:rPr lang="en-US" dirty="0" smtClean="0"/>
+          </a:p>
+          <a:p>
+            <a:r>
+              <a:rPr lang="en-US" dirty="0"/>
               <a:t>SMO (SQL Management Objects)</a:t>
             </a:r>
           </a:p>
           <a:p>
             <a:r>
-              <a:rPr lang="en-US" dirty="0" smtClean="0"/>
+              <a:rPr lang="en-US" dirty="0"/>
               <a:t>.NET Framework</a:t>
             </a:r>
           </a:p>
           <a:p>
             <a:r>
-              <a:rPr lang="en-US" dirty="0" smtClean="0"/>
+              <a:rPr lang="en-US" dirty="0"/>
               <a:t>TSQL versus Cmdlets</a:t>
             </a:r>
           </a:p>
           <a:p>
             <a:r>
-              <a:rPr lang="en-US" dirty="0" smtClean="0"/>
+              <a:rPr lang="en-US" dirty="0"/>
               <a:t>Functions</a:t>
             </a:r>
           </a:p>
           <a:p>
             <a:r>
-              <a:rPr lang="en-US" dirty="0" smtClean="0"/>
+              <a:rPr lang="en-US" dirty="0"/>
               <a:t>Modules</a:t>
             </a:r>
           </a:p>
           <a:p>
             <a:r>
-              <a:rPr lang="en-US" dirty="0" smtClean="0"/>
+              <a:rPr lang="en-US" dirty="0"/>
               <a:t>Toolmaking</a:t>
             </a:r>
           </a:p>
           <a:p>
             <a:r>
-              <a:rPr lang="en-US" dirty="0" smtClean="0"/>
+              <a:rPr lang="en-US" dirty="0"/>
               <a:t>Automation</a:t>
             </a:r>
           </a:p>
           <a:p>
             <a:r>
-              <a:rPr lang="en-US" dirty="0" smtClean="0"/>
+              <a:rPr lang="en-US" dirty="0"/>
               <a:t>Using PowerShell to write dynamic TSQL code</a:t>
             </a:r>
-            <a:endParaRPr lang="en-US" dirty="0"/>
           </a:p>
         </p:txBody>
       </p:sp>
@@ -6940,9 +7160,525 @@
   <p:timing>
     <p:tnLst>
       <p:par>
-        <p:cTn id="1" dur="indefinite" restart="never" nodeType="tmRoot"/>
+        <p:cTn id="1" dur="indefinite" restart="never" nodeType="tmRoot">
+          <p:childTnLst>
+            <p:seq concurrent="1" nextAc="seek">
+              <p:cTn id="2" dur="indefinite" nodeType="mainSeq">
+                <p:childTnLst>
+                  <p:par>
+                    <p:cTn id="3" fill="hold">
+                      <p:stCondLst>
+                        <p:cond delay="indefinite"/>
+                      </p:stCondLst>
+                      <p:childTnLst>
+                        <p:par>
+                          <p:cTn id="4" fill="hold">
+                            <p:stCondLst>
+                              <p:cond delay="0"/>
+                            </p:stCondLst>
+                            <p:childTnLst>
+                              <p:par>
+                                <p:cTn id="5" presetID="1" presetClass="entr" presetSubtype="0" fill="hold" grpId="0" nodeType="clickEffect">
+                                  <p:stCondLst>
+                                    <p:cond delay="0"/>
+                                  </p:stCondLst>
+                                  <p:childTnLst>
+                                    <p:set>
+                                      <p:cBhvr>
+                                        <p:cTn id="6" dur="1" fill="hold">
+                                          <p:stCondLst>
+                                            <p:cond delay="0"/>
+                                          </p:stCondLst>
+                                        </p:cTn>
+                                        <p:tgtEl>
+                                          <p:spTgt spid="3">
+                                            <p:txEl>
+                                              <p:pRg st="0" end="0"/>
+                                            </p:txEl>
+                                          </p:spTgt>
+                                        </p:tgtEl>
+                                        <p:attrNameLst>
+                                          <p:attrName>style.visibility</p:attrName>
+                                        </p:attrNameLst>
+                                      </p:cBhvr>
+                                      <p:to>
+                                        <p:strVal val="visible"/>
+                                      </p:to>
+                                    </p:set>
+                                  </p:childTnLst>
+                                </p:cTn>
+                              </p:par>
+                            </p:childTnLst>
+                          </p:cTn>
+                        </p:par>
+                      </p:childTnLst>
+                    </p:cTn>
+                  </p:par>
+                  <p:par>
+                    <p:cTn id="7" fill="hold">
+                      <p:stCondLst>
+                        <p:cond delay="indefinite"/>
+                      </p:stCondLst>
+                      <p:childTnLst>
+                        <p:par>
+                          <p:cTn id="8" fill="hold">
+                            <p:stCondLst>
+                              <p:cond delay="0"/>
+                            </p:stCondLst>
+                            <p:childTnLst>
+                              <p:par>
+                                <p:cTn id="9" presetID="1" presetClass="entr" presetSubtype="0" fill="hold" grpId="0" nodeType="clickEffect">
+                                  <p:stCondLst>
+                                    <p:cond delay="0"/>
+                                  </p:stCondLst>
+                                  <p:childTnLst>
+                                    <p:set>
+                                      <p:cBhvr>
+                                        <p:cTn id="10" dur="1" fill="hold">
+                                          <p:stCondLst>
+                                            <p:cond delay="0"/>
+                                          </p:stCondLst>
+                                        </p:cTn>
+                                        <p:tgtEl>
+                                          <p:spTgt spid="3">
+                                            <p:txEl>
+                                              <p:pRg st="1" end="1"/>
+                                            </p:txEl>
+                                          </p:spTgt>
+                                        </p:tgtEl>
+                                        <p:attrNameLst>
+                                          <p:attrName>style.visibility</p:attrName>
+                                        </p:attrNameLst>
+                                      </p:cBhvr>
+                                      <p:to>
+                                        <p:strVal val="visible"/>
+                                      </p:to>
+                                    </p:set>
+                                  </p:childTnLst>
+                                </p:cTn>
+                              </p:par>
+                            </p:childTnLst>
+                          </p:cTn>
+                        </p:par>
+                      </p:childTnLst>
+                    </p:cTn>
+                  </p:par>
+                  <p:par>
+                    <p:cTn id="11" fill="hold">
+                      <p:stCondLst>
+                        <p:cond delay="indefinite"/>
+                      </p:stCondLst>
+                      <p:childTnLst>
+                        <p:par>
+                          <p:cTn id="12" fill="hold">
+                            <p:stCondLst>
+                              <p:cond delay="0"/>
+                            </p:stCondLst>
+                            <p:childTnLst>
+                              <p:par>
+                                <p:cTn id="13" presetID="1" presetClass="entr" presetSubtype="0" fill="hold" grpId="0" nodeType="clickEffect">
+                                  <p:stCondLst>
+                                    <p:cond delay="0"/>
+                                  </p:stCondLst>
+                                  <p:childTnLst>
+                                    <p:set>
+                                      <p:cBhvr>
+                                        <p:cTn id="14" dur="1" fill="hold">
+                                          <p:stCondLst>
+                                            <p:cond delay="0"/>
+                                          </p:stCondLst>
+                                        </p:cTn>
+                                        <p:tgtEl>
+                                          <p:spTgt spid="3">
+                                            <p:txEl>
+                                              <p:pRg st="2" end="2"/>
+                                            </p:txEl>
+                                          </p:spTgt>
+                                        </p:tgtEl>
+                                        <p:attrNameLst>
+                                          <p:attrName>style.visibility</p:attrName>
+                                        </p:attrNameLst>
+                                      </p:cBhvr>
+                                      <p:to>
+                                        <p:strVal val="visible"/>
+                                      </p:to>
+                                    </p:set>
+                                  </p:childTnLst>
+                                </p:cTn>
+                              </p:par>
+                            </p:childTnLst>
+                          </p:cTn>
+                        </p:par>
+                      </p:childTnLst>
+                    </p:cTn>
+                  </p:par>
+                  <p:par>
+                    <p:cTn id="15" fill="hold">
+                      <p:stCondLst>
+                        <p:cond delay="indefinite"/>
+                      </p:stCondLst>
+                      <p:childTnLst>
+                        <p:par>
+                          <p:cTn id="16" fill="hold">
+                            <p:stCondLst>
+                              <p:cond delay="0"/>
+                            </p:stCondLst>
+                            <p:childTnLst>
+                              <p:par>
+                                <p:cTn id="17" presetID="1" presetClass="entr" presetSubtype="0" fill="hold" grpId="0" nodeType="clickEffect">
+                                  <p:stCondLst>
+                                    <p:cond delay="0"/>
+                                  </p:stCondLst>
+                                  <p:childTnLst>
+                                    <p:set>
+                                      <p:cBhvr>
+                                        <p:cTn id="18" dur="1" fill="hold">
+                                          <p:stCondLst>
+                                            <p:cond delay="0"/>
+                                          </p:stCondLst>
+                                        </p:cTn>
+                                        <p:tgtEl>
+                                          <p:spTgt spid="3">
+                                            <p:txEl>
+                                              <p:pRg st="3" end="3"/>
+                                            </p:txEl>
+                                          </p:spTgt>
+                                        </p:tgtEl>
+                                        <p:attrNameLst>
+                                          <p:attrName>style.visibility</p:attrName>
+                                        </p:attrNameLst>
+                                      </p:cBhvr>
+                                      <p:to>
+                                        <p:strVal val="visible"/>
+                                      </p:to>
+                                    </p:set>
+                                  </p:childTnLst>
+                                </p:cTn>
+                              </p:par>
+                            </p:childTnLst>
+                          </p:cTn>
+                        </p:par>
+                      </p:childTnLst>
+                    </p:cTn>
+                  </p:par>
+                  <p:par>
+                    <p:cTn id="19" fill="hold">
+                      <p:stCondLst>
+                        <p:cond delay="indefinite"/>
+                      </p:stCondLst>
+                      <p:childTnLst>
+                        <p:par>
+                          <p:cTn id="20" fill="hold">
+                            <p:stCondLst>
+                              <p:cond delay="0"/>
+                            </p:stCondLst>
+                            <p:childTnLst>
+                              <p:par>
+                                <p:cTn id="21" presetID="1" presetClass="entr" presetSubtype="0" fill="hold" grpId="0" nodeType="clickEffect">
+                                  <p:stCondLst>
+                                    <p:cond delay="0"/>
+                                  </p:stCondLst>
+                                  <p:childTnLst>
+                                    <p:set>
+                                      <p:cBhvr>
+                                        <p:cTn id="22" dur="1" fill="hold">
+                                          <p:stCondLst>
+                                            <p:cond delay="0"/>
+                                          </p:stCondLst>
+                                        </p:cTn>
+                                        <p:tgtEl>
+                                          <p:spTgt spid="3">
+                                            <p:txEl>
+                                              <p:pRg st="4" end="4"/>
+                                            </p:txEl>
+                                          </p:spTgt>
+                                        </p:tgtEl>
+                                        <p:attrNameLst>
+                                          <p:attrName>style.visibility</p:attrName>
+                                        </p:attrNameLst>
+                                      </p:cBhvr>
+                                      <p:to>
+                                        <p:strVal val="visible"/>
+                                      </p:to>
+                                    </p:set>
+                                  </p:childTnLst>
+                                </p:cTn>
+                              </p:par>
+                            </p:childTnLst>
+                          </p:cTn>
+                        </p:par>
+                      </p:childTnLst>
+                    </p:cTn>
+                  </p:par>
+                  <p:par>
+                    <p:cTn id="23" fill="hold">
+                      <p:stCondLst>
+                        <p:cond delay="indefinite"/>
+                      </p:stCondLst>
+                      <p:childTnLst>
+                        <p:par>
+                          <p:cTn id="24" fill="hold">
+                            <p:stCondLst>
+                              <p:cond delay="0"/>
+                            </p:stCondLst>
+                            <p:childTnLst>
+                              <p:par>
+                                <p:cTn id="25" presetID="1" presetClass="entr" presetSubtype="0" fill="hold" grpId="0" nodeType="clickEffect">
+                                  <p:stCondLst>
+                                    <p:cond delay="0"/>
+                                  </p:stCondLst>
+                                  <p:childTnLst>
+                                    <p:set>
+                                      <p:cBhvr>
+                                        <p:cTn id="26" dur="1" fill="hold">
+                                          <p:stCondLst>
+                                            <p:cond delay="0"/>
+                                          </p:stCondLst>
+                                        </p:cTn>
+                                        <p:tgtEl>
+                                          <p:spTgt spid="3">
+                                            <p:txEl>
+                                              <p:pRg st="5" end="5"/>
+                                            </p:txEl>
+                                          </p:spTgt>
+                                        </p:tgtEl>
+                                        <p:attrNameLst>
+                                          <p:attrName>style.visibility</p:attrName>
+                                        </p:attrNameLst>
+                                      </p:cBhvr>
+                                      <p:to>
+                                        <p:strVal val="visible"/>
+                                      </p:to>
+                                    </p:set>
+                                  </p:childTnLst>
+                                </p:cTn>
+                              </p:par>
+                            </p:childTnLst>
+                          </p:cTn>
+                        </p:par>
+                      </p:childTnLst>
+                    </p:cTn>
+                  </p:par>
+                  <p:par>
+                    <p:cTn id="27" fill="hold">
+                      <p:stCondLst>
+                        <p:cond delay="indefinite"/>
+                      </p:stCondLst>
+                      <p:childTnLst>
+                        <p:par>
+                          <p:cTn id="28" fill="hold">
+                            <p:stCondLst>
+                              <p:cond delay="0"/>
+                            </p:stCondLst>
+                            <p:childTnLst>
+                              <p:par>
+                                <p:cTn id="29" presetID="1" presetClass="entr" presetSubtype="0" fill="hold" grpId="0" nodeType="clickEffect">
+                                  <p:stCondLst>
+                                    <p:cond delay="0"/>
+                                  </p:stCondLst>
+                                  <p:childTnLst>
+                                    <p:set>
+                                      <p:cBhvr>
+                                        <p:cTn id="30" dur="1" fill="hold">
+                                          <p:stCondLst>
+                                            <p:cond delay="0"/>
+                                          </p:stCondLst>
+                                        </p:cTn>
+                                        <p:tgtEl>
+                                          <p:spTgt spid="3">
+                                            <p:txEl>
+                                              <p:pRg st="6" end="6"/>
+                                            </p:txEl>
+                                          </p:spTgt>
+                                        </p:tgtEl>
+                                        <p:attrNameLst>
+                                          <p:attrName>style.visibility</p:attrName>
+                                        </p:attrNameLst>
+                                      </p:cBhvr>
+                                      <p:to>
+                                        <p:strVal val="visible"/>
+                                      </p:to>
+                                    </p:set>
+                                  </p:childTnLst>
+                                </p:cTn>
+                              </p:par>
+                            </p:childTnLst>
+                          </p:cTn>
+                        </p:par>
+                      </p:childTnLst>
+                    </p:cTn>
+                  </p:par>
+                  <p:par>
+                    <p:cTn id="31" fill="hold">
+                      <p:stCondLst>
+                        <p:cond delay="indefinite"/>
+                      </p:stCondLst>
+                      <p:childTnLst>
+                        <p:par>
+                          <p:cTn id="32" fill="hold">
+                            <p:stCondLst>
+                              <p:cond delay="0"/>
+                            </p:stCondLst>
+                            <p:childTnLst>
+                              <p:par>
+                                <p:cTn id="33" presetID="1" presetClass="entr" presetSubtype="0" fill="hold" grpId="0" nodeType="clickEffect">
+                                  <p:stCondLst>
+                                    <p:cond delay="0"/>
+                                  </p:stCondLst>
+                                  <p:childTnLst>
+                                    <p:set>
+                                      <p:cBhvr>
+                                        <p:cTn id="34" dur="1" fill="hold">
+                                          <p:stCondLst>
+                                            <p:cond delay="0"/>
+                                          </p:stCondLst>
+                                        </p:cTn>
+                                        <p:tgtEl>
+                                          <p:spTgt spid="3">
+                                            <p:txEl>
+                                              <p:pRg st="7" end="7"/>
+                                            </p:txEl>
+                                          </p:spTgt>
+                                        </p:tgtEl>
+                                        <p:attrNameLst>
+                                          <p:attrName>style.visibility</p:attrName>
+                                        </p:attrNameLst>
+                                      </p:cBhvr>
+                                      <p:to>
+                                        <p:strVal val="visible"/>
+                                      </p:to>
+                                    </p:set>
+                                  </p:childTnLst>
+                                </p:cTn>
+                              </p:par>
+                            </p:childTnLst>
+                          </p:cTn>
+                        </p:par>
+                      </p:childTnLst>
+                    </p:cTn>
+                  </p:par>
+                  <p:par>
+                    <p:cTn id="35" fill="hold">
+                      <p:stCondLst>
+                        <p:cond delay="indefinite"/>
+                      </p:stCondLst>
+                      <p:childTnLst>
+                        <p:par>
+                          <p:cTn id="36" fill="hold">
+                            <p:stCondLst>
+                              <p:cond delay="0"/>
+                            </p:stCondLst>
+                            <p:childTnLst>
+                              <p:par>
+                                <p:cTn id="37" presetID="1" presetClass="entr" presetSubtype="0" fill="hold" grpId="0" nodeType="clickEffect">
+                                  <p:stCondLst>
+                                    <p:cond delay="0"/>
+                                  </p:stCondLst>
+                                  <p:childTnLst>
+                                    <p:set>
+                                      <p:cBhvr>
+                                        <p:cTn id="38" dur="1" fill="hold">
+                                          <p:stCondLst>
+                                            <p:cond delay="0"/>
+                                          </p:stCondLst>
+                                        </p:cTn>
+                                        <p:tgtEl>
+                                          <p:spTgt spid="3">
+                                            <p:txEl>
+                                              <p:pRg st="8" end="8"/>
+                                            </p:txEl>
+                                          </p:spTgt>
+                                        </p:tgtEl>
+                                        <p:attrNameLst>
+                                          <p:attrName>style.visibility</p:attrName>
+                                        </p:attrNameLst>
+                                      </p:cBhvr>
+                                      <p:to>
+                                        <p:strVal val="visible"/>
+                                      </p:to>
+                                    </p:set>
+                                  </p:childTnLst>
+                                </p:cTn>
+                              </p:par>
+                            </p:childTnLst>
+                          </p:cTn>
+                        </p:par>
+                      </p:childTnLst>
+                    </p:cTn>
+                  </p:par>
+                  <p:par>
+                    <p:cTn id="39" fill="hold">
+                      <p:stCondLst>
+                        <p:cond delay="indefinite"/>
+                      </p:stCondLst>
+                      <p:childTnLst>
+                        <p:par>
+                          <p:cTn id="40" fill="hold">
+                            <p:stCondLst>
+                              <p:cond delay="0"/>
+                            </p:stCondLst>
+                            <p:childTnLst>
+                              <p:par>
+                                <p:cTn id="41" presetID="1" presetClass="entr" presetSubtype="0" fill="hold" grpId="0" nodeType="clickEffect">
+                                  <p:stCondLst>
+                                    <p:cond delay="0"/>
+                                  </p:stCondLst>
+                                  <p:childTnLst>
+                                    <p:set>
+                                      <p:cBhvr>
+                                        <p:cTn id="42" dur="1" fill="hold">
+                                          <p:stCondLst>
+                                            <p:cond delay="0"/>
+                                          </p:stCondLst>
+                                        </p:cTn>
+                                        <p:tgtEl>
+                                          <p:spTgt spid="3">
+                                            <p:txEl>
+                                              <p:pRg st="9" end="9"/>
+                                            </p:txEl>
+                                          </p:spTgt>
+                                        </p:tgtEl>
+                                        <p:attrNameLst>
+                                          <p:attrName>style.visibility</p:attrName>
+                                        </p:attrNameLst>
+                                      </p:cBhvr>
+                                      <p:to>
+                                        <p:strVal val="visible"/>
+                                      </p:to>
+                                    </p:set>
+                                  </p:childTnLst>
+                                </p:cTn>
+                              </p:par>
+                            </p:childTnLst>
+                          </p:cTn>
+                        </p:par>
+                      </p:childTnLst>
+                    </p:cTn>
+                  </p:par>
+                </p:childTnLst>
+              </p:cTn>
+              <p:prevCondLst>
+                <p:cond evt="onPrev" delay="0">
+                  <p:tgtEl>
+                    <p:sldTgt/>
+                  </p:tgtEl>
+                </p:cond>
+              </p:prevCondLst>
+              <p:nextCondLst>
+                <p:cond evt="onNext" delay="0">
+                  <p:tgtEl>
+                    <p:sldTgt/>
+                  </p:tgtEl>
+                </p:cond>
+              </p:nextCondLst>
+            </p:seq>
+          </p:childTnLst>
+        </p:cTn>
       </p:par>
     </p:tnLst>
+    <p:bldLst>
+      <p:bldP spid="3" grpId="0" build="p"/>
+    </p:bldLst>
   </p:timing>
 </p:sld>
 </file>
@@ -6980,10 +7716,9 @@
           <a:lstStyle/>
           <a:p>
             <a:r>
-              <a:rPr lang="en-US" dirty="0" smtClean="0"/>
-              <a:t>How do I install the SQL PowerShell Module?</a:t>
-            </a:r>
-            <a:endParaRPr lang="en-US" dirty="0"/>
+              <a:rPr lang="en-US" dirty="0"/>
+              <a:t>Install the SQL PowerShell Module (Old)</a:t>
+            </a:r>
           </a:p>
         </p:txBody>
       </p:sp>
@@ -7005,8 +7740,8 @@
         </p:blipFill>
         <p:spPr>
           <a:xfrm>
-            <a:off x="2388394" y="2160588"/>
-            <a:ext cx="5175249" cy="3881437"/>
+            <a:off x="1359016" y="1722017"/>
+            <a:ext cx="5659342" cy="4244507"/>
           </a:xfrm>
           <a:prstGeom prst="rect">
             <a:avLst/>
@@ -7023,13 +7758,6 @@
   <p:clrMapOvr>
     <a:masterClrMapping/>
   </p:clrMapOvr>
-  <p:timing>
-    <p:tnLst>
-      <p:par>
-        <p:cTn id="1" dur="indefinite" restart="never" nodeType="tmRoot"/>
-      </p:par>
-    </p:tnLst>
-  </p:timing>
 </p:sld>
 </file>
 
@@ -7066,10 +7794,87 @@
           <a:lstStyle/>
           <a:p>
             <a:r>
-              <a:rPr lang="en-US" dirty="0" smtClean="0"/>
+              <a:rPr lang="en-US" dirty="0"/>
+              <a:t>Install the SQL PowerShell Module (New)</a:t>
+            </a:r>
+          </a:p>
+        </p:txBody>
+      </p:sp>
+      <p:pic>
+        <p:nvPicPr>
+          <p:cNvPr id="4" name="Content Placeholder 3"/>
+          <p:cNvPicPr>
+            <a:picLocks noGrp="1" noChangeAspect="1"/>
+          </p:cNvPicPr>
+          <p:nvPr>
+            <p:ph idx="1"/>
+          </p:nvPr>
+        </p:nvPicPr>
+        <p:blipFill>
+          <a:blip r:embed="rId2"/>
+          <a:stretch>
+            <a:fillRect/>
+          </a:stretch>
+        </p:blipFill>
+        <p:spPr>
+          <a:xfrm>
+            <a:off x="1568742" y="1672466"/>
+            <a:ext cx="5109991" cy="4411504"/>
+          </a:xfrm>
+          <a:prstGeom prst="rect">
+            <a:avLst/>
+          </a:prstGeom>
+        </p:spPr>
+      </p:pic>
+    </p:spTree>
+    <p:extLst>
+      <p:ext uri="{BB962C8B-B14F-4D97-AF65-F5344CB8AC3E}">
+        <p14:creationId xmlns:p14="http://schemas.microsoft.com/office/powerpoint/2010/main" val="4187441025"/>
+      </p:ext>
+    </p:extLst>
+  </p:cSld>
+  <p:clrMapOvr>
+    <a:masterClrMapping/>
+  </p:clrMapOvr>
+</p:sld>
+</file>
+
+<file path=ppt/slides/slide7.xml><?xml version="1.0" encoding="utf-8"?>
+<p:sld xmlns:a="http://schemas.openxmlformats.org/drawingml/2006/main" xmlns:r="http://schemas.openxmlformats.org/officeDocument/2006/relationships" xmlns:p="http://schemas.openxmlformats.org/presentationml/2006/main">
+  <p:cSld>
+    <p:spTree>
+      <p:nvGrpSpPr>
+        <p:cNvPr id="1" name=""/>
+        <p:cNvGrpSpPr/>
+        <p:nvPr/>
+      </p:nvGrpSpPr>
+      <p:grpSpPr>
+        <a:xfrm>
+          <a:off x="0" y="0"/>
+          <a:ext cx="0" cy="0"/>
+          <a:chOff x="0" y="0"/>
+          <a:chExt cx="0" cy="0"/>
+        </a:xfrm>
+      </p:grpSpPr>
+      <p:sp>
+        <p:nvSpPr>
+          <p:cNvPr id="2" name="Title 1"/>
+          <p:cNvSpPr>
+            <a:spLocks noGrp="1"/>
+          </p:cNvSpPr>
+          <p:nvPr>
+            <p:ph type="title"/>
+          </p:nvPr>
+        </p:nvSpPr>
+        <p:spPr/>
+        <p:txBody>
+          <a:bodyPr/>
+          <a:lstStyle/>
+          <a:p>
+            <a:r>
+              <a:rPr lang="en-US" dirty="0"/>
               <a:t>Start-Process ‘Demo’</a:t>
             </a:r>
-            <a:endParaRPr lang="en-US" dirty="0"/>
           </a:p>
         </p:txBody>
       </p:sp>
@@ -7109,271 +7914,6 @@
   <p:clrMapOvr>
     <a:masterClrMapping/>
   </p:clrMapOvr>
-  <p:timing>
-    <p:tnLst>
-      <p:par>
-        <p:cTn id="1" dur="indefinite" restart="never" nodeType="tmRoot"/>
-      </p:par>
-    </p:tnLst>
-  </p:timing>
-</p:sld>
-</file>
-
-<file path=ppt/slides/slide7.xml><?xml version="1.0" encoding="utf-8"?>
-<p:sld xmlns:a="http://schemas.openxmlformats.org/drawingml/2006/main" xmlns:r="http://schemas.openxmlformats.org/officeDocument/2006/relationships" xmlns:p="http://schemas.openxmlformats.org/presentationml/2006/main">
-  <p:cSld>
-    <p:spTree>
-      <p:nvGrpSpPr>
-        <p:cNvPr id="1" name=""/>
-        <p:cNvGrpSpPr/>
-        <p:nvPr/>
-      </p:nvGrpSpPr>
-      <p:grpSpPr>
-        <a:xfrm>
-          <a:off x="0" y="0"/>
-          <a:ext cx="0" cy="0"/>
-          <a:chOff x="0" y="0"/>
-          <a:chExt cx="0" cy="0"/>
-        </a:xfrm>
-      </p:grpSpPr>
-      <p:sp>
-        <p:nvSpPr>
-          <p:cNvPr id="2" name="Title 1"/>
-          <p:cNvSpPr>
-            <a:spLocks noGrp="1"/>
-          </p:cNvSpPr>
-          <p:nvPr>
-            <p:ph type="title"/>
-          </p:nvPr>
-        </p:nvSpPr>
-        <p:spPr/>
-        <p:txBody>
-          <a:bodyPr/>
-          <a:lstStyle/>
-          <a:p>
-            <a:r>
-              <a:rPr lang="en-US" dirty="0" smtClean="0"/>
-              <a:t>Select-Object –Property ‘Resources’</a:t>
-            </a:r>
-            <a:endParaRPr lang="en-US" dirty="0"/>
-          </a:p>
-        </p:txBody>
-      </p:sp>
-      <p:sp>
-        <p:nvSpPr>
-          <p:cNvPr id="3" name="Content Placeholder 2"/>
-          <p:cNvSpPr>
-            <a:spLocks noGrp="1"/>
-          </p:cNvSpPr>
-          <p:nvPr>
-            <p:ph idx="1"/>
-          </p:nvPr>
-        </p:nvSpPr>
-        <p:spPr>
-          <a:xfrm>
-            <a:off x="677334" y="1463040"/>
-            <a:ext cx="8596668" cy="4987635"/>
-          </a:xfrm>
-        </p:spPr>
-        <p:txBody>
-          <a:bodyPr>
-            <a:normAutofit fontScale="92500" lnSpcReduction="20000"/>
-          </a:bodyPr>
-          <a:lstStyle/>
-          <a:p>
-            <a:r>
-              <a:rPr lang="en-US" dirty="0" smtClean="0"/>
-              <a:t>Free:</a:t>
-            </a:r>
-          </a:p>
-          <a:p>
-            <a:pPr lvl="1"/>
-            <a:r>
-              <a:rPr lang="en-US" dirty="0" smtClean="0">
-                <a:hlinkClick r:id="rId2"/>
-              </a:rPr>
-              <a:t>PowerShell.org</a:t>
-            </a:r>
-            <a:endParaRPr lang="en-US" dirty="0" smtClean="0"/>
-          </a:p>
-          <a:p>
-            <a:pPr lvl="1"/>
-            <a:r>
-              <a:rPr lang="en-US" dirty="0" smtClean="0">
-                <a:hlinkClick r:id="rId3"/>
-              </a:rPr>
-              <a:t>PowerShell Virtual Chapter of SQL PASS</a:t>
-            </a:r>
-            <a:endParaRPr lang="en-US" dirty="0" smtClean="0"/>
-          </a:p>
-          <a:p>
-            <a:pPr lvl="1"/>
-            <a:r>
-              <a:rPr lang="en-US" dirty="0" smtClean="0">
-                <a:hlinkClick r:id="rId4"/>
-              </a:rPr>
-              <a:t>SQL Saturday Technology Events</a:t>
-            </a:r>
-            <a:endParaRPr lang="en-US" dirty="0" smtClean="0"/>
-          </a:p>
-          <a:p>
-            <a:pPr lvl="1"/>
-            <a:r>
-              <a:rPr lang="en-US" dirty="0" smtClean="0">
-                <a:hlinkClick r:id="rId5"/>
-              </a:rPr>
-              <a:t>Microsoft Virtual Academy</a:t>
-            </a:r>
-            <a:endParaRPr lang="en-US" dirty="0" smtClean="0"/>
-          </a:p>
-          <a:p>
-            <a:pPr lvl="1"/>
-            <a:r>
-              <a:rPr lang="en-US" dirty="0">
-                <a:hlinkClick r:id="rId6"/>
-              </a:rPr>
-              <a:t>SAPIEN Technologies</a:t>
-            </a:r>
-            <a:endParaRPr lang="en-US" dirty="0"/>
-          </a:p>
-          <a:p>
-            <a:pPr lvl="1"/>
-            <a:r>
-              <a:rPr lang="en-US" dirty="0" smtClean="0">
-                <a:hlinkClick r:id="rId7"/>
-              </a:rPr>
-              <a:t>PowerShell Magazine</a:t>
-            </a:r>
-            <a:endParaRPr lang="en-US" dirty="0" smtClean="0"/>
-          </a:p>
-          <a:p>
-            <a:pPr lvl="1"/>
-            <a:r>
-              <a:rPr lang="en-US" smtClean="0">
-                <a:hlinkClick r:id="rId8"/>
-              </a:rPr>
-              <a:t>User </a:t>
-            </a:r>
-            <a:r>
-              <a:rPr lang="en-US" dirty="0" smtClean="0">
-                <a:hlinkClick r:id="rId8"/>
-              </a:rPr>
-              <a:t>Groups</a:t>
-            </a:r>
-            <a:endParaRPr lang="en-US" dirty="0"/>
-          </a:p>
-          <a:p>
-            <a:pPr lvl="1"/>
-            <a:r>
-              <a:rPr lang="en-US" dirty="0" smtClean="0">
-                <a:hlinkClick r:id="rId9"/>
-              </a:rPr>
-              <a:t>Twitter</a:t>
-            </a:r>
-            <a:endParaRPr lang="en-US" dirty="0" smtClean="0"/>
-          </a:p>
-          <a:p>
-            <a:pPr lvl="1"/>
-            <a:r>
-              <a:rPr lang="en-US" dirty="0">
-                <a:hlinkClick r:id="rId10"/>
-              </a:rPr>
-              <a:t>GitHub</a:t>
-            </a:r>
-            <a:endParaRPr lang="en-US" dirty="0"/>
-          </a:p>
-          <a:p>
-            <a:pPr lvl="1"/>
-            <a:r>
-              <a:rPr lang="en-US" dirty="0" smtClean="0">
-                <a:hlinkClick r:id="rId11"/>
-              </a:rPr>
-              <a:t>Reddit</a:t>
-            </a:r>
-            <a:endParaRPr lang="en-US" dirty="0" smtClean="0"/>
-          </a:p>
-          <a:p>
-            <a:pPr lvl="1"/>
-            <a:r>
-              <a:rPr lang="en-US" dirty="0" smtClean="0">
-                <a:hlinkClick r:id="rId12"/>
-              </a:rPr>
-              <a:t>Blogs</a:t>
-            </a:r>
-            <a:endParaRPr lang="en-US" dirty="0" smtClean="0"/>
-          </a:p>
-          <a:p>
-            <a:r>
-              <a:rPr lang="en-US" dirty="0" smtClean="0"/>
-              <a:t>Paid:</a:t>
-            </a:r>
-          </a:p>
-          <a:p>
-            <a:pPr lvl="1"/>
-            <a:r>
-              <a:rPr lang="en-US" dirty="0" smtClean="0">
-                <a:hlinkClick r:id="rId13"/>
-              </a:rPr>
-              <a:t>Pro PowerShell for Database Developers book</a:t>
-            </a:r>
-            <a:endParaRPr lang="en-US" dirty="0" smtClean="0"/>
-          </a:p>
-          <a:p>
-            <a:pPr lvl="1"/>
-            <a:r>
-              <a:rPr lang="en-US" dirty="0" smtClean="0">
-                <a:hlinkClick r:id="rId14"/>
-              </a:rPr>
-              <a:t>Pluralsight</a:t>
-            </a:r>
-            <a:endParaRPr lang="en-US" dirty="0" smtClean="0"/>
-          </a:p>
-          <a:p>
-            <a:endParaRPr lang="en-US" dirty="0"/>
-          </a:p>
-        </p:txBody>
-      </p:sp>
-      <p:pic>
-        <p:nvPicPr>
-          <p:cNvPr id="4" name="Picture 3"/>
-          <p:cNvPicPr>
-            <a:picLocks noChangeAspect="1"/>
-          </p:cNvPicPr>
-          <p:nvPr/>
-        </p:nvPicPr>
-        <p:blipFill>
-          <a:blip r:embed="rId15"/>
-          <a:stretch>
-            <a:fillRect/>
-          </a:stretch>
-        </p:blipFill>
-        <p:spPr>
-          <a:xfrm>
-            <a:off x="6056836" y="3408219"/>
-            <a:ext cx="1426464" cy="2033731"/>
-          </a:xfrm>
-          <a:prstGeom prst="rect">
-            <a:avLst/>
-          </a:prstGeom>
-        </p:spPr>
-      </p:pic>
-    </p:spTree>
-    <p:extLst>
-      <p:ext uri="{BB962C8B-B14F-4D97-AF65-F5344CB8AC3E}">
-        <p14:creationId xmlns:p14="http://schemas.microsoft.com/office/powerpoint/2010/main" val="1958420451"/>
-      </p:ext>
-    </p:extLst>
-  </p:cSld>
-  <p:clrMapOvr>
-    <a:masterClrMapping/>
-  </p:clrMapOvr>
-  <p:timing>
-    <p:tnLst>
-      <p:par>
-        <p:cTn id="1" dur="indefinite" restart="never" nodeType="tmRoot"/>
-      </p:par>
-    </p:tnLst>
-  </p:timing>
 </p:sld>
 </file>
 
@@ -7410,269 +7950,16 @@
           <a:lstStyle/>
           <a:p>
             <a:r>
-              <a:rPr lang="en-US" dirty="0" smtClean="0"/>
-              <a:t>Get-Contact –Identity ‘Presenter’</a:t>
-            </a:r>
-            <a:endParaRPr lang="en-US" dirty="0"/>
-          </a:p>
-        </p:txBody>
-      </p:sp>
-      <p:sp>
-        <p:nvSpPr>
-          <p:cNvPr id="3" name="Content Placeholder 2"/>
-          <p:cNvSpPr>
-            <a:spLocks noGrp="1"/>
-          </p:cNvSpPr>
-          <p:nvPr>
-            <p:ph idx="1"/>
-          </p:nvPr>
-        </p:nvSpPr>
-        <p:spPr/>
-        <p:txBody>
-          <a:bodyPr/>
-          <a:lstStyle/>
-          <a:p>
-            <a:r>
-              <a:rPr lang="en-US" dirty="0" smtClean="0"/>
-              <a:t>Blog: </a:t>
-            </a:r>
-            <a:r>
-              <a:rPr lang="en-US" dirty="0" smtClean="0">
-                <a:hlinkClick r:id="rId2"/>
-              </a:rPr>
-              <a:t>mikefrobbins.com</a:t>
-            </a:r>
-            <a:r>
-              <a:rPr lang="en-US" dirty="0" smtClean="0"/>
-              <a:t> (or MrPowerShell.com)</a:t>
-            </a:r>
-          </a:p>
-          <a:p>
-            <a:endParaRPr lang="en-US" dirty="0" smtClean="0"/>
-          </a:p>
-          <a:p>
-            <a:endParaRPr lang="en-US" dirty="0"/>
-          </a:p>
-          <a:p>
-            <a:endParaRPr lang="en-US" dirty="0" smtClean="0"/>
-          </a:p>
-          <a:p>
-            <a:endParaRPr lang="en-US" dirty="0"/>
-          </a:p>
-          <a:p>
-            <a:r>
-              <a:rPr lang="en-US" dirty="0" smtClean="0"/>
-              <a:t>Twitter: </a:t>
-            </a:r>
-            <a:r>
-              <a:rPr lang="en-US" dirty="0" smtClean="0">
-                <a:hlinkClick r:id="rId3"/>
-              </a:rPr>
-              <a:t>@mikefrobbins</a:t>
-            </a:r>
-            <a:endParaRPr lang="en-US" dirty="0" smtClean="0"/>
-          </a:p>
-          <a:p>
-            <a:r>
-              <a:rPr lang="en-US" dirty="0" smtClean="0"/>
-              <a:t>LinkedIn</a:t>
-            </a:r>
-            <a:r>
               <a:rPr lang="en-US" dirty="0"/>
-              <a:t>: </a:t>
-            </a:r>
-            <a:r>
-              <a:rPr lang="en-US" dirty="0" smtClean="0">
-                <a:hlinkClick r:id="rId4"/>
-              </a:rPr>
-              <a:t>www.linkedin.com/in/mikefrobbins</a:t>
-            </a:r>
-            <a:endParaRPr lang="en-US" dirty="0" smtClean="0"/>
-          </a:p>
-          <a:p>
-            <a:r>
+              <a:t>Celebrating 10 Years of PowerShell</a:t>
+            </a:r>
+            <a:br>
               <a:rPr lang="en-US" dirty="0"/>
-              <a:t>Email: See </a:t>
-            </a:r>
-            <a:r>
-              <a:rPr lang="en-US" dirty="0" smtClean="0">
-                <a:hlinkClick r:id="rId5"/>
-              </a:rPr>
-              <a:t>mikefrobbins.com/about</a:t>
-            </a:r>
-            <a:r>
-              <a:rPr lang="en-US" dirty="0">
-                <a:hlinkClick r:id="rId5"/>
-              </a:rPr>
-              <a:t>/</a:t>
-            </a:r>
-            <a:endParaRPr lang="en-US" dirty="0" smtClean="0"/>
-          </a:p>
-          <a:p>
-            <a:r>
-              <a:rPr lang="en-US" dirty="0" smtClean="0"/>
-              <a:t>User Group: </a:t>
-            </a:r>
-            <a:r>
-              <a:rPr lang="en-US" dirty="0" smtClean="0">
-                <a:hlinkClick r:id="rId6"/>
-              </a:rPr>
-              <a:t>mspsug.com</a:t>
-            </a:r>
-            <a:r>
-              <a:rPr lang="en-US" dirty="0" smtClean="0"/>
-              <a:t> (or MsPowerShell.com)</a:t>
-            </a:r>
-            <a:endParaRPr lang="en-US" dirty="0"/>
-          </a:p>
-        </p:txBody>
-      </p:sp>
-      <p:pic>
-        <p:nvPicPr>
-          <p:cNvPr id="5" name="Picture 4">
-            <a:hlinkClick r:id="rId7"/>
-          </p:cNvPr>
-          <p:cNvPicPr>
-            <a:picLocks noChangeAspect="1"/>
-          </p:cNvPicPr>
-          <p:nvPr/>
-        </p:nvPicPr>
-        <p:blipFill>
-          <a:blip r:embed="rId8"/>
-          <a:stretch>
-            <a:fillRect/>
-          </a:stretch>
-        </p:blipFill>
-        <p:spPr>
-          <a:xfrm>
-            <a:off x="6810375" y="1930400"/>
-            <a:ext cx="1428750" cy="2038349"/>
-          </a:xfrm>
-          <a:prstGeom prst="rect">
-            <a:avLst/>
-          </a:prstGeom>
-        </p:spPr>
-      </p:pic>
-      <p:pic>
-        <p:nvPicPr>
-          <p:cNvPr id="6" name="Picture 5">
-            <a:hlinkClick r:id="rId9"/>
-          </p:cNvPr>
-          <p:cNvPicPr>
-            <a:picLocks noChangeAspect="1"/>
-          </p:cNvPicPr>
-          <p:nvPr/>
-        </p:nvPicPr>
-        <p:blipFill>
-          <a:blip r:embed="rId10"/>
-          <a:stretch>
-            <a:fillRect/>
-          </a:stretch>
-        </p:blipFill>
-        <p:spPr>
-          <a:xfrm>
-            <a:off x="6810375" y="4260187"/>
-            <a:ext cx="1428750" cy="1781175"/>
-          </a:xfrm>
-          <a:prstGeom prst="rect">
-            <a:avLst/>
-          </a:prstGeom>
-        </p:spPr>
-      </p:pic>
-      <p:pic>
-        <p:nvPicPr>
-          <p:cNvPr id="7" name="Picture 6"/>
-          <p:cNvPicPr>
-            <a:picLocks noChangeAspect="1"/>
-          </p:cNvPicPr>
-          <p:nvPr/>
-        </p:nvPicPr>
-        <p:blipFill>
-          <a:blip r:embed="rId11" cstate="print">
-            <a:extLst>
-              <a:ext uri="{28A0092B-C50C-407E-A947-70E740481C1C}">
-                <a14:useLocalDpi xmlns:a14="http://schemas.microsoft.com/office/drawing/2010/main" val="0"/>
-              </a:ext>
-            </a:extLst>
-          </a:blip>
-          <a:stretch>
-            <a:fillRect/>
-          </a:stretch>
-        </p:blipFill>
-        <p:spPr>
-          <a:xfrm>
-            <a:off x="1821016" y="2527089"/>
-            <a:ext cx="1578888" cy="1578888"/>
-          </a:xfrm>
-          <a:prstGeom prst="rect">
-            <a:avLst/>
-          </a:prstGeom>
-        </p:spPr>
-      </p:pic>
-    </p:spTree>
-    <p:extLst>
-      <p:ext uri="{BB962C8B-B14F-4D97-AF65-F5344CB8AC3E}">
-        <p14:creationId xmlns:p14="http://schemas.microsoft.com/office/powerpoint/2010/main" val="4048166820"/>
-      </p:ext>
-    </p:extLst>
-  </p:cSld>
-  <p:clrMapOvr>
-    <a:masterClrMapping/>
-  </p:clrMapOvr>
-  <p:timing>
-    <p:tnLst>
-      <p:par>
-        <p:cTn id="1" dur="indefinite" restart="never" nodeType="tmRoot"/>
-      </p:par>
-    </p:tnLst>
-  </p:timing>
-</p:sld>
-</file>
-
-<file path=ppt/slides/slide9.xml><?xml version="1.0" encoding="utf-8"?>
-<p:sld xmlns:a="http://schemas.openxmlformats.org/drawingml/2006/main" xmlns:r="http://schemas.openxmlformats.org/officeDocument/2006/relationships" xmlns:p="http://schemas.openxmlformats.org/presentationml/2006/main">
-  <p:cSld>
-    <p:spTree>
-      <p:nvGrpSpPr>
-        <p:cNvPr id="1" name=""/>
-        <p:cNvGrpSpPr/>
-        <p:nvPr/>
-      </p:nvGrpSpPr>
-      <p:grpSpPr>
-        <a:xfrm>
-          <a:off x="0" y="0"/>
-          <a:ext cx="0" cy="0"/>
-          <a:chOff x="0" y="0"/>
-          <a:chExt cx="0" cy="0"/>
-        </a:xfrm>
-      </p:grpSpPr>
-      <p:sp>
-        <p:nvSpPr>
-          <p:cNvPr id="2" name="Title 1"/>
-          <p:cNvSpPr>
-            <a:spLocks noGrp="1"/>
-          </p:cNvSpPr>
-          <p:nvPr>
-            <p:ph type="title"/>
-          </p:nvPr>
-        </p:nvSpPr>
-        <p:spPr/>
-        <p:txBody>
-          <a:bodyPr/>
-          <a:lstStyle/>
-          <a:p>
-            <a:r>
-              <a:rPr lang="en-US" dirty="0" smtClean="0"/>
-              <a:t>Celebrating 10 Years of PowerShell</a:t>
-            </a:r>
-            <a:br>
-              <a:rPr lang="en-US" dirty="0" smtClean="0"/>
             </a:br>
             <a:r>
-              <a:rPr lang="en-US" dirty="0" smtClean="0"/>
+              <a:rPr lang="en-US" dirty="0"/>
               <a:t>2006 - 2016</a:t>
             </a:r>
-            <a:endParaRPr lang="en-US" dirty="0"/>
           </a:p>
         </p:txBody>
       </p:sp>
@@ -7699,90 +7986,90 @@
           <a:lstStyle/>
           <a:p>
             <a:r>
-              <a:rPr lang="en-US" dirty="0" smtClean="0"/>
+              <a:rPr lang="en-US" dirty="0"/>
               <a:t>Jeffrey </a:t>
             </a:r>
             <a:r>
-              <a:rPr lang="en-US" dirty="0" err="1" smtClean="0"/>
+              <a:rPr lang="en-US" dirty="0" err="1"/>
               <a:t>Snover</a:t>
             </a:r>
-            <a:endParaRPr lang="en-US" dirty="0" smtClean="0"/>
-          </a:p>
-          <a:p>
-            <a:r>
-              <a:rPr lang="en-US" dirty="0" smtClean="0"/>
+            <a:endParaRPr lang="en-US" dirty="0"/>
+          </a:p>
+          <a:p>
+            <a:r>
+              <a:rPr lang="en-US" dirty="0"/>
               <a:t>Kenneth Hansen</a:t>
             </a:r>
           </a:p>
           <a:p>
             <a:r>
-              <a:rPr lang="en-US" dirty="0" smtClean="0"/>
+              <a:rPr lang="en-US" dirty="0"/>
               <a:t>Lee Holmes</a:t>
             </a:r>
           </a:p>
           <a:p>
             <a:r>
-              <a:rPr lang="en-US" dirty="0" smtClean="0"/>
+              <a:rPr lang="en-US" dirty="0"/>
               <a:t>Narayanan </a:t>
             </a:r>
             <a:r>
-              <a:rPr lang="en-US" dirty="0" err="1" smtClean="0"/>
+              <a:rPr lang="en-US" dirty="0" err="1"/>
               <a:t>Lakshmanan</a:t>
             </a:r>
-            <a:endParaRPr lang="en-US" dirty="0" smtClean="0"/>
-          </a:p>
-          <a:p>
-            <a:r>
-              <a:rPr lang="en-US" dirty="0" smtClean="0"/>
+            <a:endParaRPr lang="en-US" dirty="0"/>
+          </a:p>
+          <a:p>
+            <a:r>
+              <a:rPr lang="en-US" dirty="0"/>
               <a:t>Hemant Mahawar</a:t>
             </a:r>
           </a:p>
           <a:p>
             <a:r>
-              <a:rPr lang="en-US" dirty="0" smtClean="0"/>
+              <a:rPr lang="en-US" dirty="0"/>
               <a:t>Bruce Payette</a:t>
             </a:r>
           </a:p>
           <a:p>
             <a:r>
-              <a:rPr lang="en-US" dirty="0" smtClean="0"/>
+              <a:rPr lang="en-US" dirty="0"/>
               <a:t>Hitesh </a:t>
             </a:r>
             <a:r>
-              <a:rPr lang="en-US" dirty="0" err="1" smtClean="0"/>
+              <a:rPr lang="en-US" dirty="0" err="1"/>
               <a:t>Raigandhi</a:t>
             </a:r>
-            <a:endParaRPr lang="en-US" dirty="0" smtClean="0"/>
-          </a:p>
-          <a:p>
-            <a:r>
-              <a:rPr lang="en-US" dirty="0" smtClean="0"/>
+            <a:endParaRPr lang="en-US" dirty="0"/>
+          </a:p>
+          <a:p>
+            <a:r>
+              <a:rPr lang="en-US" dirty="0"/>
               <a:t>Dan </a:t>
             </a:r>
             <a:r>
-              <a:rPr lang="en-US" dirty="0" err="1" smtClean="0"/>
+              <a:rPr lang="en-US" dirty="0" err="1"/>
               <a:t>Travison</a:t>
             </a:r>
-            <a:endParaRPr lang="en-US" dirty="0" smtClean="0"/>
-          </a:p>
-          <a:p>
-            <a:r>
-              <a:rPr lang="en-US" dirty="0" smtClean="0"/>
+            <a:endParaRPr lang="en-US" dirty="0"/>
+          </a:p>
+          <a:p>
+            <a:r>
+              <a:rPr lang="en-US" dirty="0"/>
               <a:t>Jim </a:t>
             </a:r>
             <a:r>
-              <a:rPr lang="en-US" dirty="0" err="1" smtClean="0"/>
+              <a:rPr lang="en-US" dirty="0" err="1"/>
               <a:t>Truher</a:t>
             </a:r>
-            <a:endParaRPr lang="en-US" dirty="0" smtClean="0"/>
-          </a:p>
-          <a:p>
-            <a:r>
-              <a:rPr lang="en-US" dirty="0" smtClean="0"/>
+            <a:endParaRPr lang="en-US" dirty="0"/>
+          </a:p>
+          <a:p>
+            <a:r>
+              <a:rPr lang="en-US" dirty="0"/>
               <a:t>Krishna </a:t>
             </a:r>
             <a:r>
-              <a:rPr lang="en-US" dirty="0" err="1" smtClean="0"/>
+              <a:rPr lang="en-US" dirty="0" err="1"/>
               <a:t>Vutukuri</a:t>
             </a:r>
             <a:endParaRPr lang="en-US" dirty="0"/>
@@ -8042,11 +8329,11 @@
               <a:buNone/>
             </a:pPr>
             <a:r>
-              <a:rPr lang="en-US" sz="3200" dirty="0" smtClean="0"/>
+              <a:rPr lang="en-US" sz="3200" dirty="0"/>
               <a:t>Congratulations to the team members who’ve been there since the beginning</a:t>
             </a:r>
             <a:r>
-              <a:rPr lang="is-IS" sz="3200" dirty="0" smtClean="0"/>
+              <a:rPr lang="is-IS" sz="3200" dirty="0"/>
               <a:t>…</a:t>
             </a:r>
           </a:p>
@@ -8055,7 +8342,7 @@
               <a:buNone/>
             </a:pPr>
             <a:r>
-              <a:rPr lang="is-IS" sz="3200" dirty="0" smtClean="0"/>
+              <a:rPr lang="is-IS" sz="3200" dirty="0"/>
               <a:t>...and thanks for all the great work!</a:t>
             </a:r>
             <a:endParaRPr lang="en-US" sz="3200" dirty="0"/>
@@ -8072,13 +8359,250 @@
   <p:clrMapOvr>
     <a:masterClrMapping/>
   </p:clrMapOvr>
-  <p:timing>
-    <p:tnLst>
-      <p:par>
-        <p:cTn id="1" dur="indefinite" restart="never" nodeType="tmRoot"/>
-      </p:par>
-    </p:tnLst>
-  </p:timing>
+</p:sld>
+</file>
+
+<file path=ppt/slides/slide9.xml><?xml version="1.0" encoding="utf-8"?>
+<p:sld xmlns:a="http://schemas.openxmlformats.org/drawingml/2006/main" xmlns:r="http://schemas.openxmlformats.org/officeDocument/2006/relationships" xmlns:p="http://schemas.openxmlformats.org/presentationml/2006/main">
+  <p:cSld>
+    <p:spTree>
+      <p:nvGrpSpPr>
+        <p:cNvPr id="1" name=""/>
+        <p:cNvGrpSpPr/>
+        <p:nvPr/>
+      </p:nvGrpSpPr>
+      <p:grpSpPr>
+        <a:xfrm>
+          <a:off x="0" y="0"/>
+          <a:ext cx="0" cy="0"/>
+          <a:chOff x="0" y="0"/>
+          <a:chExt cx="0" cy="0"/>
+        </a:xfrm>
+      </p:grpSpPr>
+      <p:sp>
+        <p:nvSpPr>
+          <p:cNvPr id="2" name="Title 1"/>
+          <p:cNvSpPr>
+            <a:spLocks noGrp="1"/>
+          </p:cNvSpPr>
+          <p:nvPr>
+            <p:ph type="title"/>
+          </p:nvPr>
+        </p:nvSpPr>
+        <p:spPr/>
+        <p:txBody>
+          <a:bodyPr/>
+          <a:lstStyle/>
+          <a:p>
+            <a:r>
+              <a:rPr lang="en-US" dirty="0"/>
+              <a:t>Select-Object –Property ‘Resources’</a:t>
+            </a:r>
+          </a:p>
+        </p:txBody>
+      </p:sp>
+      <p:sp>
+        <p:nvSpPr>
+          <p:cNvPr id="3" name="Content Placeholder 2"/>
+          <p:cNvSpPr>
+            <a:spLocks noGrp="1"/>
+          </p:cNvSpPr>
+          <p:nvPr>
+            <p:ph idx="1"/>
+          </p:nvPr>
+        </p:nvSpPr>
+        <p:spPr>
+          <a:xfrm>
+            <a:off x="677334" y="1463040"/>
+            <a:ext cx="8596668" cy="4987635"/>
+          </a:xfrm>
+        </p:spPr>
+        <p:txBody>
+          <a:bodyPr>
+            <a:normAutofit fontScale="92500" lnSpcReduction="20000"/>
+          </a:bodyPr>
+          <a:lstStyle/>
+          <a:p>
+            <a:r>
+              <a:rPr lang="en-US" dirty="0"/>
+              <a:t>Free:</a:t>
+            </a:r>
+          </a:p>
+          <a:p>
+            <a:pPr lvl="1"/>
+            <a:r>
+              <a:rPr lang="en-US" dirty="0">
+                <a:hlinkClick r:id="rId2"/>
+              </a:rPr>
+              <a:t>PowerShell.org</a:t>
+            </a:r>
+            <a:endParaRPr lang="en-US" dirty="0"/>
+          </a:p>
+          <a:p>
+            <a:pPr lvl="1"/>
+            <a:r>
+              <a:rPr lang="en-US" dirty="0">
+                <a:hlinkClick r:id="rId3"/>
+              </a:rPr>
+              <a:t>PowerShell Virtual Chapter of SQL PASS</a:t>
+            </a:r>
+            <a:endParaRPr lang="en-US" dirty="0"/>
+          </a:p>
+          <a:p>
+            <a:pPr lvl="1"/>
+            <a:r>
+              <a:rPr lang="en-US" dirty="0">
+                <a:hlinkClick r:id="rId4"/>
+              </a:rPr>
+              <a:t>SQL Saturday Technology Events</a:t>
+            </a:r>
+            <a:endParaRPr lang="en-US" dirty="0"/>
+          </a:p>
+          <a:p>
+            <a:pPr lvl="1"/>
+            <a:r>
+              <a:rPr lang="en-US" dirty="0">
+                <a:hlinkClick r:id="rId5"/>
+              </a:rPr>
+              <a:t>Microsoft Virtual Academy</a:t>
+            </a:r>
+            <a:endParaRPr lang="en-US" dirty="0"/>
+          </a:p>
+          <a:p>
+            <a:pPr lvl="1"/>
+            <a:r>
+              <a:rPr lang="en-US" dirty="0">
+                <a:hlinkClick r:id="rId6"/>
+              </a:rPr>
+              <a:t>SAPIEN Technologies</a:t>
+            </a:r>
+            <a:endParaRPr lang="en-US" dirty="0"/>
+          </a:p>
+          <a:p>
+            <a:pPr lvl="1"/>
+            <a:r>
+              <a:rPr lang="en-US" dirty="0">
+                <a:hlinkClick r:id="rId7"/>
+              </a:rPr>
+              <a:t>PowerShell Magazine</a:t>
+            </a:r>
+            <a:endParaRPr lang="en-US" dirty="0"/>
+          </a:p>
+          <a:p>
+            <a:pPr lvl="1"/>
+            <a:r>
+              <a:rPr lang="en-US" dirty="0">
+                <a:hlinkClick r:id="rId8"/>
+              </a:rPr>
+              <a:t>User Groups</a:t>
+            </a:r>
+            <a:endParaRPr lang="en-US" dirty="0"/>
+          </a:p>
+          <a:p>
+            <a:pPr lvl="1"/>
+            <a:r>
+              <a:rPr lang="en-US" dirty="0">
+                <a:hlinkClick r:id="rId9"/>
+              </a:rPr>
+              <a:t>Twitter</a:t>
+            </a:r>
+            <a:endParaRPr lang="en-US" dirty="0"/>
+          </a:p>
+          <a:p>
+            <a:pPr lvl="1"/>
+            <a:r>
+              <a:rPr lang="en-US" dirty="0">
+                <a:hlinkClick r:id="rId10"/>
+              </a:rPr>
+              <a:t>GitHub</a:t>
+            </a:r>
+            <a:endParaRPr lang="en-US" dirty="0"/>
+          </a:p>
+          <a:p>
+            <a:pPr lvl="1"/>
+            <a:r>
+              <a:rPr lang="en-US" dirty="0">
+                <a:hlinkClick r:id="rId11"/>
+              </a:rPr>
+              <a:t>Blogs</a:t>
+            </a:r>
+            <a:endParaRPr lang="en-US" dirty="0"/>
+          </a:p>
+          <a:p>
+            <a:pPr lvl="1"/>
+            <a:r>
+              <a:rPr lang="en-US" dirty="0">
+                <a:hlinkClick r:id="rId12"/>
+              </a:rPr>
+              <a:t>PowerShell Best Practices and Style Guide</a:t>
+            </a:r>
+            <a:endParaRPr lang="en-US" dirty="0"/>
+          </a:p>
+          <a:p>
+            <a:r>
+              <a:rPr lang="en-US" dirty="0"/>
+              <a:t>Paid:</a:t>
+            </a:r>
+          </a:p>
+          <a:p>
+            <a:pPr lvl="1"/>
+            <a:r>
+              <a:rPr lang="en-US" dirty="0">
+                <a:hlinkClick r:id="rId13"/>
+              </a:rPr>
+              <a:t>Pro PowerShell for Database Developers book</a:t>
+            </a:r>
+            <a:endParaRPr lang="en-US" dirty="0"/>
+          </a:p>
+          <a:p>
+            <a:pPr lvl="1"/>
+            <a:r>
+              <a:rPr lang="en-US" dirty="0">
+                <a:hlinkClick r:id="rId14"/>
+              </a:rPr>
+              <a:t>Pluralsight</a:t>
+            </a:r>
+            <a:endParaRPr lang="en-US" dirty="0"/>
+          </a:p>
+          <a:p>
+            <a:endParaRPr lang="en-US" dirty="0"/>
+          </a:p>
+        </p:txBody>
+      </p:sp>
+      <p:pic>
+        <p:nvPicPr>
+          <p:cNvPr id="4" name="Picture 3"/>
+          <p:cNvPicPr>
+            <a:picLocks noChangeAspect="1"/>
+          </p:cNvPicPr>
+          <p:nvPr/>
+        </p:nvPicPr>
+        <p:blipFill>
+          <a:blip r:embed="rId15"/>
+          <a:stretch>
+            <a:fillRect/>
+          </a:stretch>
+        </p:blipFill>
+        <p:spPr>
+          <a:xfrm>
+            <a:off x="6056836" y="3408219"/>
+            <a:ext cx="1426464" cy="2033731"/>
+          </a:xfrm>
+          <a:prstGeom prst="rect">
+            <a:avLst/>
+          </a:prstGeom>
+        </p:spPr>
+      </p:pic>
+    </p:spTree>
+    <p:extLst>
+      <p:ext uri="{BB962C8B-B14F-4D97-AF65-F5344CB8AC3E}">
+        <p14:creationId xmlns:p14="http://schemas.microsoft.com/office/powerpoint/2010/main" val="1958420451"/>
+      </p:ext>
+    </p:extLst>
+  </p:cSld>
+  <p:clrMapOvr>
+    <a:masterClrMapping/>
+  </p:clrMapOvr>
 </p:sld>
 </file>
 

</xml_diff>